<commit_message>
Code and Document slightly modified.
</commit_message>
<xml_diff>
--- a/Document/Cohort11_Group6_CapstoneProject_Presentation.pptx
+++ b/Document/Cohort11_Group6_CapstoneProject_Presentation.pptx
@@ -5,7 +5,7 @@
     <p:sldMasterId id="2147483648" r:id="rId1"/>
   </p:sldMasterIdLst>
   <p:notesMasterIdLst>
-    <p:notesMasterId r:id="rId38"/>
+    <p:notesMasterId r:id="rId42"/>
   </p:notesMasterIdLst>
   <p:sldIdLst>
     <p:sldId id="285" r:id="rId2"/>
@@ -21,29 +21,33 @@
     <p:sldId id="293" r:id="rId12"/>
     <p:sldId id="295" r:id="rId13"/>
     <p:sldId id="296" r:id="rId14"/>
-    <p:sldId id="263" r:id="rId15"/>
-    <p:sldId id="294" r:id="rId16"/>
+    <p:sldId id="298" r:id="rId15"/>
+    <p:sldId id="299" r:id="rId16"/>
     <p:sldId id="297" r:id="rId17"/>
-    <p:sldId id="265" r:id="rId18"/>
-    <p:sldId id="266" r:id="rId19"/>
-    <p:sldId id="267" r:id="rId20"/>
-    <p:sldId id="268" r:id="rId21"/>
-    <p:sldId id="269" r:id="rId22"/>
-    <p:sldId id="270" r:id="rId23"/>
-    <p:sldId id="271" r:id="rId24"/>
-    <p:sldId id="272" r:id="rId25"/>
-    <p:sldId id="273" r:id="rId26"/>
-    <p:sldId id="274" r:id="rId27"/>
-    <p:sldId id="275" r:id="rId28"/>
-    <p:sldId id="276" r:id="rId29"/>
-    <p:sldId id="277" r:id="rId30"/>
-    <p:sldId id="278" r:id="rId31"/>
-    <p:sldId id="279" r:id="rId32"/>
-    <p:sldId id="280" r:id="rId33"/>
-    <p:sldId id="281" r:id="rId34"/>
-    <p:sldId id="282" r:id="rId35"/>
-    <p:sldId id="283" r:id="rId36"/>
-    <p:sldId id="284" r:id="rId37"/>
+    <p:sldId id="300" r:id="rId18"/>
+    <p:sldId id="263" r:id="rId19"/>
+    <p:sldId id="301" r:id="rId20"/>
+    <p:sldId id="302" r:id="rId21"/>
+    <p:sldId id="265" r:id="rId22"/>
+    <p:sldId id="266" r:id="rId23"/>
+    <p:sldId id="267" r:id="rId24"/>
+    <p:sldId id="268" r:id="rId25"/>
+    <p:sldId id="269" r:id="rId26"/>
+    <p:sldId id="270" r:id="rId27"/>
+    <p:sldId id="271" r:id="rId28"/>
+    <p:sldId id="272" r:id="rId29"/>
+    <p:sldId id="273" r:id="rId30"/>
+    <p:sldId id="274" r:id="rId31"/>
+    <p:sldId id="275" r:id="rId32"/>
+    <p:sldId id="276" r:id="rId33"/>
+    <p:sldId id="277" r:id="rId34"/>
+    <p:sldId id="278" r:id="rId35"/>
+    <p:sldId id="279" r:id="rId36"/>
+    <p:sldId id="280" r:id="rId37"/>
+    <p:sldId id="281" r:id="rId38"/>
+    <p:sldId id="282" r:id="rId39"/>
+    <p:sldId id="283" r:id="rId40"/>
+    <p:sldId id="284" r:id="rId41"/>
   </p:sldIdLst>
   <p:sldSz cx="9144000" cy="6858000" type="screen4x3"/>
   <p:notesSz cx="6858000" cy="9144000"/>
@@ -898,7 +902,7 @@
           <a:p>
             <a:fld id="{5BCAD085-E8A6-8845-BD4E-CB4CCA059FC4}" type="datetimeFigureOut">
               <a:rPr lang="en-US" smtClean="0"/>
-              <a:t>3/21/2025</a:t>
+              <a:t>3/22/2025</a:t>
             </a:fld>
             <a:endParaRPr lang="en-US"/>
           </a:p>
@@ -1066,7 +1070,7 @@
           <a:p>
             <a:fld id="{5BCAD085-E8A6-8845-BD4E-CB4CCA059FC4}" type="datetimeFigureOut">
               <a:rPr lang="en-US" smtClean="0"/>
-              <a:t>3/21/2025</a:t>
+              <a:t>3/22/2025</a:t>
             </a:fld>
             <a:endParaRPr lang="en-US"/>
           </a:p>
@@ -1244,7 +1248,7 @@
           <a:p>
             <a:fld id="{5BCAD085-E8A6-8845-BD4E-CB4CCA059FC4}" type="datetimeFigureOut">
               <a:rPr lang="en-US" smtClean="0"/>
-              <a:t>3/21/2025</a:t>
+              <a:t>3/22/2025</a:t>
             </a:fld>
             <a:endParaRPr lang="en-US"/>
           </a:p>
@@ -1412,7 +1416,7 @@
           <a:p>
             <a:fld id="{5BCAD085-E8A6-8845-BD4E-CB4CCA059FC4}" type="datetimeFigureOut">
               <a:rPr lang="en-US" smtClean="0"/>
-              <a:t>3/21/2025</a:t>
+              <a:t>3/22/2025</a:t>
             </a:fld>
             <a:endParaRPr lang="en-US"/>
           </a:p>
@@ -1657,7 +1661,7 @@
           <a:p>
             <a:fld id="{5BCAD085-E8A6-8845-BD4E-CB4CCA059FC4}" type="datetimeFigureOut">
               <a:rPr lang="en-US" smtClean="0"/>
-              <a:t>3/21/2025</a:t>
+              <a:t>3/22/2025</a:t>
             </a:fld>
             <a:endParaRPr lang="en-US"/>
           </a:p>
@@ -1942,7 +1946,7 @@
           <a:p>
             <a:fld id="{5BCAD085-E8A6-8845-BD4E-CB4CCA059FC4}" type="datetimeFigureOut">
               <a:rPr lang="en-US" smtClean="0"/>
-              <a:t>3/21/2025</a:t>
+              <a:t>3/22/2025</a:t>
             </a:fld>
             <a:endParaRPr lang="en-US"/>
           </a:p>
@@ -2361,7 +2365,7 @@
           <a:p>
             <a:fld id="{5BCAD085-E8A6-8845-BD4E-CB4CCA059FC4}" type="datetimeFigureOut">
               <a:rPr lang="en-US" smtClean="0"/>
-              <a:t>3/21/2025</a:t>
+              <a:t>3/22/2025</a:t>
             </a:fld>
             <a:endParaRPr lang="en-US"/>
           </a:p>
@@ -2478,7 +2482,7 @@
           <a:p>
             <a:fld id="{5BCAD085-E8A6-8845-BD4E-CB4CCA059FC4}" type="datetimeFigureOut">
               <a:rPr lang="en-US" smtClean="0"/>
-              <a:t>3/21/2025</a:t>
+              <a:t>3/22/2025</a:t>
             </a:fld>
             <a:endParaRPr lang="en-US"/>
           </a:p>
@@ -2573,7 +2577,7 @@
           <a:p>
             <a:fld id="{5BCAD085-E8A6-8845-BD4E-CB4CCA059FC4}" type="datetimeFigureOut">
               <a:rPr lang="en-US" smtClean="0"/>
-              <a:t>3/21/2025</a:t>
+              <a:t>3/22/2025</a:t>
             </a:fld>
             <a:endParaRPr lang="en-US"/>
           </a:p>
@@ -2848,7 +2852,7 @@
           <a:p>
             <a:fld id="{5BCAD085-E8A6-8845-BD4E-CB4CCA059FC4}" type="datetimeFigureOut">
               <a:rPr lang="en-US" smtClean="0"/>
-              <a:t>3/21/2025</a:t>
+              <a:t>3/22/2025</a:t>
             </a:fld>
             <a:endParaRPr lang="en-US"/>
           </a:p>
@@ -3100,7 +3104,7 @@
           <a:p>
             <a:fld id="{5BCAD085-E8A6-8845-BD4E-CB4CCA059FC4}" type="datetimeFigureOut">
               <a:rPr lang="en-US" smtClean="0"/>
-              <a:t>3/21/2025</a:t>
+              <a:t>3/22/2025</a:t>
             </a:fld>
             <a:endParaRPr lang="en-US"/>
           </a:p>
@@ -3311,7 +3315,7 @@
           <a:p>
             <a:fld id="{5BCAD085-E8A6-8845-BD4E-CB4CCA059FC4}" type="datetimeFigureOut">
               <a:rPr lang="en-US" smtClean="0"/>
-              <a:t>3/21/2025</a:t>
+              <a:t>3/22/2025</a:t>
             </a:fld>
             <a:endParaRPr lang="en-US"/>
           </a:p>
@@ -6809,10 +6813,10 @@
       </p:grpSpPr>
       <p:sp>
         <p:nvSpPr>
-          <p:cNvPr id="6" name="TextBox 5">
+          <p:cNvPr id="2" name="TextBox 1">
             <a:extLst>
               <a:ext uri="{FF2B5EF4-FFF2-40B4-BE49-F238E27FC236}">
-                <a16:creationId xmlns:a16="http://schemas.microsoft.com/office/drawing/2014/main" id="{D072F1FE-4405-A7EC-B364-895750404926}"/>
+                <a16:creationId xmlns:a16="http://schemas.microsoft.com/office/drawing/2014/main" id="{D81EC396-5C3D-79B3-656D-57008062CB5D}"/>
               </a:ext>
             </a:extLst>
           </p:cNvPr>
@@ -6821,8 +6825,8 @@
         </p:nvSpPr>
         <p:spPr>
           <a:xfrm>
-            <a:off x="717755" y="542920"/>
-            <a:ext cx="6225970" cy="584775"/>
+            <a:off x="540774" y="432619"/>
+            <a:ext cx="8062452" cy="1831271"/>
           </a:xfrm>
           <a:prstGeom prst="rect">
             <a:avLst/>
@@ -6835,73 +6839,77 @@
           </a:bodyPr>
           <a:lstStyle/>
           <a:p>
-            <a:pPr algn="l">
-              <a:buNone/>
-            </a:pPr>
-            <a:r>
-              <a:rPr lang="en-US" sz="3200" b="1" i="0" dirty="0">
-                <a:solidFill>
-                  <a:srgbClr val="1F2328"/>
-                </a:solidFill>
-                <a:effectLst/>
-                <a:latin typeface="Arial" panose="020B0604020202020204" pitchFamily="34" charset="0"/>
-                <a:cs typeface="Arial" panose="020B0604020202020204" pitchFamily="34" charset="0"/>
-              </a:rPr>
-              <a:t>7. Analyzing the Data (EDA)</a:t>
-            </a:r>
-          </a:p>
-        </p:txBody>
-      </p:sp>
-      <p:sp>
-        <p:nvSpPr>
-          <p:cNvPr id="7" name="TextBox 6">
-            <a:extLst>
-              <a:ext uri="{FF2B5EF4-FFF2-40B4-BE49-F238E27FC236}">
-                <a16:creationId xmlns:a16="http://schemas.microsoft.com/office/drawing/2014/main" id="{56CEE9F9-E8B8-29B7-BCC8-3C2AAB873EEA}"/>
-              </a:ext>
-            </a:extLst>
-          </p:cNvPr>
-          <p:cNvSpPr txBox="1"/>
-          <p:nvPr/>
-        </p:nvSpPr>
-        <p:spPr>
-          <a:xfrm>
-            <a:off x="717755" y="1271770"/>
-            <a:ext cx="7954297" cy="1477328"/>
-          </a:xfrm>
-          <a:prstGeom prst="rect">
-            <a:avLst/>
-          </a:prstGeom>
-          <a:noFill/>
-        </p:spPr>
-        <p:txBody>
-          <a:bodyPr wrap="square" rtlCol="0">
-            <a:spAutoFit/>
-          </a:bodyPr>
-          <a:lstStyle/>
-          <a:p>
-            <a:r>
-              <a:rPr lang="en-US" dirty="0">
-                <a:latin typeface="Arial" panose="020B0604020202020204" pitchFamily="34" charset="0"/>
-                <a:cs typeface="Arial" panose="020B0604020202020204" pitchFamily="34" charset="0"/>
-              </a:rPr>
-              <a:t>Here, first we perform EDA on Expert generated Data set. We try to understand the data then create some machine Learning model on top of it.</a:t>
-            </a:r>
-          </a:p>
-          <a:p>
-            <a:endParaRPr lang="en-US" dirty="0">
+            <a:r>
+              <a:rPr lang="en-US" b="1" dirty="0">
+                <a:latin typeface="Arial" panose="020B0604020202020204" pitchFamily="34" charset="0"/>
+                <a:cs typeface="Arial" panose="020B0604020202020204" pitchFamily="34" charset="0"/>
+              </a:rPr>
+              <a:t>A. Dataset Overview:</a:t>
+            </a:r>
+          </a:p>
+          <a:p>
+            <a:endParaRPr lang="en-US" sz="1100" b="1" dirty="0">
               <a:latin typeface="Arial" panose="020B0604020202020204" pitchFamily="34" charset="0"/>
               <a:cs typeface="Arial" panose="020B0604020202020204" pitchFamily="34" charset="0"/>
             </a:endParaRPr>
           </a:p>
           <a:p>
             <a:r>
-              <a:rPr lang="en-US" dirty="0">
-                <a:latin typeface="Arial" panose="020B0604020202020204" pitchFamily="34" charset="0"/>
-                <a:cs typeface="Arial" panose="020B0604020202020204" pitchFamily="34" charset="0"/>
-              </a:rPr>
-              <a:t>Start with loading the feature.txt file then train data and test data and analysis these data.</a:t>
-            </a:r>
+              <a:rPr lang="en-US" sz="1400" dirty="0">
+                <a:latin typeface="Arial" panose="020B0604020202020204" pitchFamily="34" charset="0"/>
+                <a:cs typeface="Arial" panose="020B0604020202020204" pitchFamily="34" charset="0"/>
+              </a:rPr>
+              <a:t>1. Train set: 7,352 rows × 563 columns</a:t>
+            </a:r>
+          </a:p>
+          <a:p>
+            <a:r>
+              <a:rPr lang="en-US" sz="1400" dirty="0">
+                <a:latin typeface="Arial" panose="020B0604020202020204" pitchFamily="34" charset="0"/>
+                <a:cs typeface="Arial" panose="020B0604020202020204" pitchFamily="34" charset="0"/>
+              </a:rPr>
+              <a:t>2. Test set: 2,947 rows × 563 columns</a:t>
+            </a:r>
+          </a:p>
+          <a:p>
+            <a:r>
+              <a:rPr lang="en-US" sz="1400" dirty="0">
+                <a:latin typeface="Arial" panose="020B0604020202020204" pitchFamily="34" charset="0"/>
+                <a:cs typeface="Arial" panose="020B0604020202020204" pitchFamily="34" charset="0"/>
+              </a:rPr>
+              <a:t>3. Feature types:</a:t>
+            </a:r>
+          </a:p>
+          <a:p>
+            <a:r>
+              <a:rPr lang="en-US" sz="1400" dirty="0">
+                <a:latin typeface="Arial" panose="020B0604020202020204" pitchFamily="34" charset="0"/>
+                <a:cs typeface="Arial" panose="020B0604020202020204" pitchFamily="34" charset="0"/>
+              </a:rPr>
+              <a:t>    - 561 float64 features (sensor readings)</a:t>
+            </a:r>
+          </a:p>
+          <a:p>
+            <a:r>
+              <a:rPr lang="en-US" sz="1400" dirty="0">
+                <a:latin typeface="Arial" panose="020B0604020202020204" pitchFamily="34" charset="0"/>
+                <a:cs typeface="Arial" panose="020B0604020202020204" pitchFamily="34" charset="0"/>
+              </a:rPr>
+              <a:t>    - 1 int64 column: subject (subject ID)</a:t>
+            </a:r>
+          </a:p>
+          <a:p>
+            <a:r>
+              <a:rPr lang="en-US" sz="1400" dirty="0">
+                <a:latin typeface="Arial" panose="020B0604020202020204" pitchFamily="34" charset="0"/>
+                <a:cs typeface="Arial" panose="020B0604020202020204" pitchFamily="34" charset="0"/>
+              </a:rPr>
+              <a:t>    - 1 object column: Activity (target label)</a:t>
+            </a:r>
+            <a:endParaRPr lang="en-IN" sz="1400" dirty="0">
+              <a:latin typeface="Arial" panose="020B0604020202020204" pitchFamily="34" charset="0"/>
+              <a:cs typeface="Arial" panose="020B0604020202020204" pitchFamily="34" charset="0"/>
+            </a:endParaRPr>
           </a:p>
         </p:txBody>
       </p:sp>
@@ -6927,8 +6935,8 @@
         </p:blipFill>
         <p:spPr>
           <a:xfrm>
-            <a:off x="717755" y="2893173"/>
-            <a:ext cx="7708490" cy="3633691"/>
+            <a:off x="589935" y="2490050"/>
+            <a:ext cx="8062452" cy="4166389"/>
           </a:xfrm>
           <a:prstGeom prst="rect">
             <a:avLst/>
@@ -6936,6 +6944,11 @@
         </p:spPr>
       </p:pic>
     </p:spTree>
+    <p:extLst>
+      <p:ext uri="{BB962C8B-B14F-4D97-AF65-F5344CB8AC3E}">
+        <p14:creationId xmlns:p14="http://schemas.microsoft.com/office/powerpoint/2010/main" val="2828914606"/>
+      </p:ext>
+    </p:extLst>
   </p:cSld>
   <p:clrMapOvr>
     <a:masterClrMapping/>
@@ -6965,7 +6978,7 @@
           <p:cNvPr id="2" name="TextBox 1">
             <a:extLst>
               <a:ext uri="{FF2B5EF4-FFF2-40B4-BE49-F238E27FC236}">
-                <a16:creationId xmlns:a16="http://schemas.microsoft.com/office/drawing/2014/main" id="{C7937E48-7A6D-9DA0-9D87-511EF59A85E5}"/>
+                <a16:creationId xmlns:a16="http://schemas.microsoft.com/office/drawing/2014/main" id="{4D240629-6E9C-01B9-35D8-F76490A2B7C7}"/>
               </a:ext>
             </a:extLst>
           </p:cNvPr>
@@ -6974,8 +6987,8 @@
         </p:nvSpPr>
         <p:spPr>
           <a:xfrm>
-            <a:off x="717756" y="533106"/>
-            <a:ext cx="3500284" cy="369332"/>
+            <a:off x="550607" y="432619"/>
+            <a:ext cx="7010400" cy="1831271"/>
           </a:xfrm>
           <a:prstGeom prst="rect">
             <a:avLst/>
@@ -6989,11 +7002,59 @@
           <a:lstStyle/>
           <a:p>
             <a:r>
-              <a:rPr lang="en-US" dirty="0">
-                <a:latin typeface="Arial" panose="020B0604020202020204" pitchFamily="34" charset="0"/>
-                <a:cs typeface="Arial" panose="020B0604020202020204" pitchFamily="34" charset="0"/>
-              </a:rPr>
-              <a:t>Finding out the Missing Values</a:t>
+              <a:rPr lang="en-US" b="1" dirty="0">
+                <a:latin typeface="Arial" panose="020B0604020202020204" pitchFamily="34" charset="0"/>
+                <a:cs typeface="Arial" panose="020B0604020202020204" pitchFamily="34" charset="0"/>
+              </a:rPr>
+              <a:t>B. Finding out the Missing Values</a:t>
+            </a:r>
+          </a:p>
+          <a:p>
+            <a:endParaRPr lang="en-US" sz="1100" dirty="0">
+              <a:latin typeface="Arial" panose="020B0604020202020204" pitchFamily="34" charset="0"/>
+              <a:cs typeface="Arial" panose="020B0604020202020204" pitchFamily="34" charset="0"/>
+            </a:endParaRPr>
+          </a:p>
+          <a:p>
+            <a:r>
+              <a:rPr lang="en-US" sz="1400" dirty="0">
+                <a:latin typeface="Arial" panose="020B0604020202020204" pitchFamily="34" charset="0"/>
+                <a:cs typeface="Arial" panose="020B0604020202020204" pitchFamily="34" charset="0"/>
+              </a:rPr>
+              <a:t>- Missing Values:</a:t>
+            </a:r>
+          </a:p>
+          <a:p>
+            <a:r>
+              <a:rPr lang="en-US" sz="1400" dirty="0">
+                <a:latin typeface="Arial" panose="020B0604020202020204" pitchFamily="34" charset="0"/>
+                <a:cs typeface="Arial" panose="020B0604020202020204" pitchFamily="34" charset="0"/>
+              </a:rPr>
+              <a:t>    1. Train Set: 0 missing values </a:t>
+            </a:r>
+          </a:p>
+          <a:p>
+            <a:r>
+              <a:rPr lang="en-US" sz="1400" dirty="0">
+                <a:latin typeface="Arial" panose="020B0604020202020204" pitchFamily="34" charset="0"/>
+                <a:cs typeface="Arial" panose="020B0604020202020204" pitchFamily="34" charset="0"/>
+              </a:rPr>
+              <a:t>    2. Test Set: 0 missing values </a:t>
+            </a:r>
+          </a:p>
+          <a:p>
+            <a:endParaRPr lang="en-US" sz="1400" dirty="0">
+              <a:latin typeface="Arial" panose="020B0604020202020204" pitchFamily="34" charset="0"/>
+              <a:cs typeface="Arial" panose="020B0604020202020204" pitchFamily="34" charset="0"/>
+            </a:endParaRPr>
+          </a:p>
+          <a:p>
+            <a:r>
+              <a:rPr lang="en-US" sz="1400" dirty="0">
+                <a:latin typeface="Arial" panose="020B0604020202020204" pitchFamily="34" charset="0"/>
+                <a:cs typeface="Arial" panose="020B0604020202020204" pitchFamily="34" charset="0"/>
+              </a:rPr>
+              <a:t>- Sensor Noise (Potential Outliers): About 40,503 values exceed a z-score of 3, which might indicate sensor noise or extreme readings.</a:t>
             </a:r>
           </a:p>
         </p:txBody>
@@ -7003,7 +7064,7 @@
           <p:cNvPr id="4" name="Picture 3">
             <a:extLst>
               <a:ext uri="{FF2B5EF4-FFF2-40B4-BE49-F238E27FC236}">
-                <a16:creationId xmlns:a16="http://schemas.microsoft.com/office/drawing/2014/main" id="{DF78CCE4-B414-F0BD-D5E2-EF8610B052CC}"/>
+                <a16:creationId xmlns:a16="http://schemas.microsoft.com/office/drawing/2014/main" id="{8B61D88F-DE78-1FC4-9414-5C46FADA1241}"/>
               </a:ext>
             </a:extLst>
           </p:cNvPr>
@@ -7020,98 +7081,18 @@
         </p:blipFill>
         <p:spPr>
           <a:xfrm>
-            <a:off x="717756" y="1105896"/>
-            <a:ext cx="7443018" cy="3141639"/>
+            <a:off x="550607" y="2420686"/>
+            <a:ext cx="7570837" cy="4092295"/>
           </a:xfrm>
           <a:prstGeom prst="rect">
             <a:avLst/>
           </a:prstGeom>
         </p:spPr>
       </p:pic>
-      <p:sp>
-        <p:nvSpPr>
-          <p:cNvPr id="5" name="TextBox 4">
-            <a:extLst>
-              <a:ext uri="{FF2B5EF4-FFF2-40B4-BE49-F238E27FC236}">
-                <a16:creationId xmlns:a16="http://schemas.microsoft.com/office/drawing/2014/main" id="{21803E66-2E49-E9C0-5C4B-BCF00A8C31D1}"/>
-              </a:ext>
-            </a:extLst>
-          </p:cNvPr>
-          <p:cNvSpPr txBox="1"/>
-          <p:nvPr/>
-        </p:nvSpPr>
-        <p:spPr>
-          <a:xfrm>
-            <a:off x="717755" y="4450993"/>
-            <a:ext cx="7718321" cy="923330"/>
-          </a:xfrm>
-          <a:prstGeom prst="rect">
-            <a:avLst/>
-          </a:prstGeom>
-          <a:noFill/>
-        </p:spPr>
-        <p:txBody>
-          <a:bodyPr wrap="square" rtlCol="0">
-            <a:spAutoFit/>
-          </a:bodyPr>
-          <a:lstStyle/>
-          <a:p>
-            <a:r>
-              <a:rPr lang="en-US" dirty="0">
-                <a:latin typeface="Arial" panose="020B0604020202020204" pitchFamily="34" charset="0"/>
-                <a:cs typeface="Arial" panose="020B0604020202020204" pitchFamily="34" charset="0"/>
-              </a:rPr>
-              <a:t>Both the </a:t>
-            </a:r>
-            <a:r>
-              <a:rPr lang="en-US" b="1" dirty="0">
-                <a:latin typeface="Arial" panose="020B0604020202020204" pitchFamily="34" charset="0"/>
-                <a:cs typeface="Arial" panose="020B0604020202020204" pitchFamily="34" charset="0"/>
-              </a:rPr>
-              <a:t>train.csv</a:t>
-            </a:r>
-            <a:r>
-              <a:rPr lang="en-US" dirty="0">
-                <a:latin typeface="Arial" panose="020B0604020202020204" pitchFamily="34" charset="0"/>
-                <a:cs typeface="Arial" panose="020B0604020202020204" pitchFamily="34" charset="0"/>
-              </a:rPr>
-              <a:t> and </a:t>
-            </a:r>
-            <a:r>
-              <a:rPr lang="en-US" b="1" dirty="0">
-                <a:latin typeface="Arial" panose="020B0604020202020204" pitchFamily="34" charset="0"/>
-                <a:cs typeface="Arial" panose="020B0604020202020204" pitchFamily="34" charset="0"/>
-              </a:rPr>
-              <a:t>test.csv</a:t>
-            </a:r>
-            <a:r>
-              <a:rPr lang="en-US" dirty="0">
-                <a:latin typeface="Arial" panose="020B0604020202020204" pitchFamily="34" charset="0"/>
-                <a:cs typeface="Arial" panose="020B0604020202020204" pitchFamily="34" charset="0"/>
-              </a:rPr>
-              <a:t> datasets have </a:t>
-            </a:r>
-            <a:r>
-              <a:rPr lang="en-US" b="1" dirty="0">
-                <a:latin typeface="Arial" panose="020B0604020202020204" pitchFamily="34" charset="0"/>
-                <a:cs typeface="Arial" panose="020B0604020202020204" pitchFamily="34" charset="0"/>
-              </a:rPr>
-              <a:t>no missing values</a:t>
-            </a:r>
-            <a:r>
-              <a:rPr lang="en-US" dirty="0">
-                <a:latin typeface="Arial" panose="020B0604020202020204" pitchFamily="34" charset="0"/>
-                <a:cs typeface="Arial" panose="020B0604020202020204" pitchFamily="34" charset="0"/>
-              </a:rPr>
-              <a:t>—all columns are fully populated. Let me know if you'd like to explore anything else in the data!</a:t>
-            </a:r>
-          </a:p>
-        </p:txBody>
-      </p:sp>
     </p:spTree>
     <p:extLst>
       <p:ext uri="{BB962C8B-B14F-4D97-AF65-F5344CB8AC3E}">
-        <p14:creationId xmlns:p14="http://schemas.microsoft.com/office/powerpoint/2010/main" val="1991576024"/>
+        <p14:creationId xmlns:p14="http://schemas.microsoft.com/office/powerpoint/2010/main" val="421638572"/>
       </p:ext>
     </p:extLst>
   </p:cSld>
@@ -7153,7 +7134,7 @@
         <p:spPr>
           <a:xfrm>
             <a:off x="412955" y="442452"/>
-            <a:ext cx="8131277" cy="1200329"/>
+            <a:ext cx="8131277" cy="1077218"/>
           </a:xfrm>
           <a:prstGeom prst="rect">
             <a:avLst/>
@@ -7167,6 +7148,16 @@
           <a:lstStyle/>
           <a:p>
             <a:r>
+              <a:rPr lang="en-US" b="1" dirty="0">
+                <a:solidFill>
+                  <a:srgbClr val="1F2328"/>
+                </a:solidFill>
+                <a:latin typeface="Arial" panose="020B0604020202020204" pitchFamily="34" charset="0"/>
+                <a:cs typeface="Arial" panose="020B0604020202020204" pitchFamily="34" charset="0"/>
+              </a:rPr>
+              <a:t>C. </a:t>
+            </a:r>
+            <a:r>
               <a:rPr lang="en-US" b="1" i="0" dirty="0">
                 <a:solidFill>
                   <a:srgbClr val="1F2328"/>
@@ -7188,6 +7179,8 @@
               </a:rPr>
               <a:t>: </a:t>
             </a:r>
+          </a:p>
+          <a:p>
             <a:endParaRPr lang="en-US" dirty="0">
               <a:solidFill>
                 <a:srgbClr val="1F2328"/>
@@ -7198,7 +7191,7 @@
           </a:p>
           <a:p>
             <a:r>
-              <a:rPr lang="en-US" b="0" i="0" dirty="0">
+              <a:rPr lang="en-US" sz="1400" b="0" i="0" dirty="0">
                 <a:solidFill>
                   <a:srgbClr val="1F2328"/>
                 </a:solidFill>
@@ -7208,7 +7201,7 @@
               </a:rPr>
               <a:t>Since the dataset has been created in a scientific environment nearly equal preconditions for the participants can be assumed. Let us investigate their activity durations.</a:t>
             </a:r>
-            <a:endParaRPr lang="en-IN" dirty="0">
+            <a:endParaRPr lang="en-IN" sz="1400" dirty="0">
               <a:latin typeface="Arial" panose="020B0604020202020204" pitchFamily="34" charset="0"/>
               <a:cs typeface="Arial" panose="020B0604020202020204" pitchFamily="34" charset="0"/>
             </a:endParaRPr>
@@ -7289,7 +7282,7 @@
         <p:spPr>
           <a:xfrm>
             <a:off x="4759617" y="2064176"/>
-            <a:ext cx="4069751" cy="938719"/>
+            <a:ext cx="4069751" cy="1338828"/>
           </a:xfrm>
           <a:prstGeom prst="rect">
             <a:avLst/>
@@ -7307,7 +7300,7 @@
               <a:buChar char="•"/>
             </a:pPr>
             <a:r>
-              <a:rPr lang="en-US" sz="1100" b="0" i="0" dirty="0">
+              <a:rPr lang="en-US" sz="1400" b="0" i="0" dirty="0">
                 <a:solidFill>
                   <a:srgbClr val="1F2328"/>
                 </a:solidFill>
@@ -7345,7 +7338,7 @@
         <p:spPr>
           <a:xfrm>
             <a:off x="0" y="4491944"/>
-            <a:ext cx="3581400" cy="1446550"/>
+            <a:ext cx="3581400" cy="2031325"/>
           </a:xfrm>
           <a:prstGeom prst="rect">
             <a:avLst/>
@@ -7363,7 +7356,7 @@
               <a:buChar char="•"/>
             </a:pPr>
             <a:r>
-              <a:rPr lang="en-US" sz="1100" b="0" i="0" dirty="0">
+              <a:rPr lang="en-US" sz="1400" b="0" i="0" dirty="0">
                 <a:solidFill>
                   <a:srgbClr val="1F2328"/>
                 </a:solidFill>
@@ -7379,7 +7372,7 @@
               <a:buFont typeface="Arial" panose="020B0604020202020204" pitchFamily="34" charset="0"/>
               <a:buChar char="•"/>
             </a:pPr>
-            <a:endParaRPr lang="en-US" sz="1100" b="0" i="0" dirty="0">
+            <a:endParaRPr lang="en-US" sz="1400" b="0" i="0" dirty="0">
               <a:solidFill>
                 <a:srgbClr val="1F2328"/>
               </a:solidFill>
@@ -7394,7 +7387,7 @@
               <a:buChar char="•"/>
             </a:pPr>
             <a:r>
-              <a:rPr lang="en-US" sz="1100" b="0" i="0" dirty="0">
+              <a:rPr lang="en-US" sz="1400" b="0" i="0" dirty="0">
                 <a:solidFill>
                   <a:srgbClr val="1F2328"/>
                 </a:solidFill>
@@ -7439,45 +7432,127 @@
       </p:grpSpPr>
       <p:sp>
         <p:nvSpPr>
-          <p:cNvPr id="2" name="Title 1"/>
-          <p:cNvSpPr>
-            <a:spLocks noGrp="1"/>
-          </p:cNvSpPr>
-          <p:nvPr>
-            <p:ph type="title"/>
-          </p:nvPr>
-        </p:nvSpPr>
-        <p:spPr/>
-        <p:txBody>
-          <a:bodyPr/>
+          <p:cNvPr id="2" name="TextBox 1">
+            <a:extLst>
+              <a:ext uri="{FF2B5EF4-FFF2-40B4-BE49-F238E27FC236}">
+                <a16:creationId xmlns:a16="http://schemas.microsoft.com/office/drawing/2014/main" id="{D4C0B610-4AEF-DD2E-C200-714549AFC065}"/>
+              </a:ext>
+            </a:extLst>
+          </p:cNvPr>
+          <p:cNvSpPr txBox="1"/>
+          <p:nvPr/>
+        </p:nvSpPr>
+        <p:spPr>
+          <a:xfrm>
+            <a:off x="757084" y="497381"/>
+            <a:ext cx="6361471" cy="1077218"/>
+          </a:xfrm>
+          <a:prstGeom prst="rect">
+            <a:avLst/>
+          </a:prstGeom>
+          <a:noFill/>
+        </p:spPr>
+        <p:txBody>
+          <a:bodyPr wrap="square" rtlCol="0">
+            <a:spAutoFit/>
+          </a:bodyPr>
           <a:lstStyle/>
           <a:p>
             <a:r>
-              <a:t>EDA: Gyroscope Mean Values</a:t>
-            </a:r>
-          </a:p>
-        </p:txBody>
-      </p:sp>
-      <p:sp>
-        <p:nvSpPr>
-          <p:cNvPr id="3" name="Content Placeholder 2"/>
-          <p:cNvSpPr>
-            <a:spLocks noGrp="1"/>
-          </p:cNvSpPr>
-          <p:nvPr>
-            <p:ph idx="1"/>
-          </p:nvPr>
-        </p:nvSpPr>
-        <p:spPr/>
-        <p:txBody>
-          <a:bodyPr/>
-          <a:lstStyle/>
-          <a:p>
-            <a:endParaRPr/>
-          </a:p>
-        </p:txBody>
-      </p:sp>
+              <a:rPr lang="en-US" b="1" dirty="0">
+                <a:latin typeface="Arial" panose="020B0604020202020204" pitchFamily="34" charset="0"/>
+                <a:cs typeface="Arial" panose="020B0604020202020204" pitchFamily="34" charset="0"/>
+              </a:rPr>
+              <a:t>D. Normalize the numerical features : </a:t>
+            </a:r>
+          </a:p>
+          <a:p>
+            <a:endParaRPr lang="en-US" b="1" dirty="0">
+              <a:latin typeface="Arial" panose="020B0604020202020204" pitchFamily="34" charset="0"/>
+              <a:cs typeface="Arial" panose="020B0604020202020204" pitchFamily="34" charset="0"/>
+            </a:endParaRPr>
+          </a:p>
+          <a:p>
+            <a:r>
+              <a:rPr lang="en-US" sz="1400" dirty="0">
+                <a:latin typeface="Arial" panose="020B0604020202020204" pitchFamily="34" charset="0"/>
+                <a:cs typeface="Arial" panose="020B0604020202020204" pitchFamily="34" charset="0"/>
+              </a:rPr>
+              <a:t>Ensure proper scaling for machine learning models. Scaling to transform values into the range [0,1]. </a:t>
+            </a:r>
+            <a:endParaRPr lang="en-IN" sz="1400" dirty="0">
+              <a:latin typeface="Arial" panose="020B0604020202020204" pitchFamily="34" charset="0"/>
+              <a:cs typeface="Arial" panose="020B0604020202020204" pitchFamily="34" charset="0"/>
+            </a:endParaRPr>
+          </a:p>
+        </p:txBody>
+      </p:sp>
+      <p:pic>
+        <p:nvPicPr>
+          <p:cNvPr id="4" name="Picture 3">
+            <a:extLst>
+              <a:ext uri="{FF2B5EF4-FFF2-40B4-BE49-F238E27FC236}">
+                <a16:creationId xmlns:a16="http://schemas.microsoft.com/office/drawing/2014/main" id="{0FAD3465-FC33-5A4B-E09B-A043E94DD43F}"/>
+              </a:ext>
+            </a:extLst>
+          </p:cNvPr>
+          <p:cNvPicPr>
+            <a:picLocks noChangeAspect="1"/>
+          </p:cNvPicPr>
+          <p:nvPr/>
+        </p:nvPicPr>
+        <p:blipFill>
+          <a:blip r:embed="rId2"/>
+          <a:stretch>
+            <a:fillRect/>
+          </a:stretch>
+        </p:blipFill>
+        <p:spPr>
+          <a:xfrm>
+            <a:off x="757083" y="1577179"/>
+            <a:ext cx="6893495" cy="1954631"/>
+          </a:xfrm>
+          <a:prstGeom prst="rect">
+            <a:avLst/>
+          </a:prstGeom>
+        </p:spPr>
+      </p:pic>
+      <p:pic>
+        <p:nvPicPr>
+          <p:cNvPr id="6" name="Picture 5">
+            <a:extLst>
+              <a:ext uri="{FF2B5EF4-FFF2-40B4-BE49-F238E27FC236}">
+                <a16:creationId xmlns:a16="http://schemas.microsoft.com/office/drawing/2014/main" id="{E89E05A0-35C4-3DCA-4DE1-DA91DAA57434}"/>
+              </a:ext>
+            </a:extLst>
+          </p:cNvPr>
+          <p:cNvPicPr>
+            <a:picLocks noChangeAspect="1"/>
+          </p:cNvPicPr>
+          <p:nvPr/>
+        </p:nvPicPr>
+        <p:blipFill>
+          <a:blip r:embed="rId3"/>
+          <a:stretch>
+            <a:fillRect/>
+          </a:stretch>
+        </p:blipFill>
+        <p:spPr>
+          <a:xfrm>
+            <a:off x="757084" y="3974263"/>
+            <a:ext cx="6893494" cy="2023161"/>
+          </a:xfrm>
+          <a:prstGeom prst="rect">
+            <a:avLst/>
+          </a:prstGeom>
+        </p:spPr>
+      </p:pic>
     </p:spTree>
+    <p:extLst>
+      <p:ext uri="{BB962C8B-B14F-4D97-AF65-F5344CB8AC3E}">
+        <p14:creationId xmlns:p14="http://schemas.microsoft.com/office/powerpoint/2010/main" val="1931983328"/>
+      </p:ext>
+    </p:extLst>
   </p:cSld>
   <p:clrMapOvr>
     <a:masterClrMapping/>
@@ -7504,44 +7579,150 @@
       </p:grpSpPr>
       <p:sp>
         <p:nvSpPr>
-          <p:cNvPr id="2" name="Title 1"/>
-          <p:cNvSpPr>
-            <a:spLocks noGrp="1"/>
-          </p:cNvSpPr>
-          <p:nvPr>
-            <p:ph type="title"/>
-          </p:nvPr>
-        </p:nvSpPr>
-        <p:spPr/>
-        <p:txBody>
-          <a:bodyPr/>
+          <p:cNvPr id="6" name="TextBox 5">
+            <a:extLst>
+              <a:ext uri="{FF2B5EF4-FFF2-40B4-BE49-F238E27FC236}">
+                <a16:creationId xmlns:a16="http://schemas.microsoft.com/office/drawing/2014/main" id="{D072F1FE-4405-A7EC-B364-895750404926}"/>
+              </a:ext>
+            </a:extLst>
+          </p:cNvPr>
+          <p:cNvSpPr txBox="1"/>
+          <p:nvPr/>
+        </p:nvSpPr>
+        <p:spPr>
+          <a:xfrm>
+            <a:off x="717755" y="542920"/>
+            <a:ext cx="6225970" cy="584775"/>
+          </a:xfrm>
+          <a:prstGeom prst="rect">
+            <a:avLst/>
+          </a:prstGeom>
+          <a:noFill/>
+        </p:spPr>
+        <p:txBody>
+          <a:bodyPr wrap="square" rtlCol="0">
+            <a:spAutoFit/>
+          </a:bodyPr>
           <a:lstStyle/>
           <a:p>
-            <a:r>
-              <a:t>EDA: Accelerometer Time-Series</a:t>
-            </a:r>
-          </a:p>
-        </p:txBody>
-      </p:sp>
-      <p:sp>
-        <p:nvSpPr>
-          <p:cNvPr id="3" name="Content Placeholder 2"/>
-          <p:cNvSpPr>
-            <a:spLocks noGrp="1"/>
-          </p:cNvSpPr>
-          <p:nvPr>
-            <p:ph idx="1"/>
-          </p:nvPr>
-        </p:nvSpPr>
-        <p:spPr/>
-        <p:txBody>
-          <a:bodyPr/>
+            <a:pPr algn="l">
+              <a:buNone/>
+            </a:pPr>
+            <a:r>
+              <a:rPr lang="en-US" sz="3200" b="1" i="0" dirty="0">
+                <a:solidFill>
+                  <a:srgbClr val="1F2328"/>
+                </a:solidFill>
+                <a:effectLst/>
+                <a:latin typeface="Arial" panose="020B0604020202020204" pitchFamily="34" charset="0"/>
+                <a:cs typeface="Arial" panose="020B0604020202020204" pitchFamily="34" charset="0"/>
+              </a:rPr>
+              <a:t>7. Analyzing the Data (EDA)</a:t>
+            </a:r>
+          </a:p>
+        </p:txBody>
+      </p:sp>
+      <p:sp>
+        <p:nvSpPr>
+          <p:cNvPr id="7" name="TextBox 6">
+            <a:extLst>
+              <a:ext uri="{FF2B5EF4-FFF2-40B4-BE49-F238E27FC236}">
+                <a16:creationId xmlns:a16="http://schemas.microsoft.com/office/drawing/2014/main" id="{56CEE9F9-E8B8-29B7-BCC8-3C2AAB873EEA}"/>
+              </a:ext>
+            </a:extLst>
+          </p:cNvPr>
+          <p:cNvSpPr txBox="1"/>
+          <p:nvPr/>
+        </p:nvSpPr>
+        <p:spPr>
+          <a:xfrm>
+            <a:off x="717755" y="1127695"/>
+            <a:ext cx="7954297" cy="1384995"/>
+          </a:xfrm>
+          <a:prstGeom prst="rect">
+            <a:avLst/>
+          </a:prstGeom>
+          <a:noFill/>
+        </p:spPr>
+        <p:txBody>
+          <a:bodyPr wrap="square" rtlCol="0">
+            <a:spAutoFit/>
+          </a:bodyPr>
           <a:lstStyle/>
           <a:p>
-            <a:endParaRPr/>
-          </a:p>
-        </p:txBody>
-      </p:sp>
+            <a:r>
+              <a:rPr lang="en-US" sz="1400" dirty="0">
+                <a:latin typeface="Arial" panose="020B0604020202020204" pitchFamily="34" charset="0"/>
+                <a:cs typeface="Arial" panose="020B0604020202020204" pitchFamily="34" charset="0"/>
+              </a:rPr>
+              <a:t>Here, first we perform EDA on Expert generated Data set. We try to understand the data then create some machine Learning model on top of it.</a:t>
+            </a:r>
+          </a:p>
+          <a:p>
+            <a:endParaRPr lang="en-US" sz="1400" dirty="0">
+              <a:latin typeface="Arial" panose="020B0604020202020204" pitchFamily="34" charset="0"/>
+              <a:cs typeface="Arial" panose="020B0604020202020204" pitchFamily="34" charset="0"/>
+            </a:endParaRPr>
+          </a:p>
+          <a:p>
+            <a:r>
+              <a:rPr lang="en-US" sz="1400" dirty="0">
+                <a:latin typeface="Arial" panose="020B0604020202020204" pitchFamily="34" charset="0"/>
+                <a:cs typeface="Arial" panose="020B0604020202020204" pitchFamily="34" charset="0"/>
+              </a:rPr>
+              <a:t>- Understanding trends in human movement.</a:t>
+            </a:r>
+          </a:p>
+          <a:p>
+            <a:r>
+              <a:rPr lang="en-US" sz="1400" dirty="0">
+                <a:latin typeface="Arial" panose="020B0604020202020204" pitchFamily="34" charset="0"/>
+                <a:cs typeface="Arial" panose="020B0604020202020204" pitchFamily="34" charset="0"/>
+              </a:rPr>
+              <a:t>- Identifying variations across different activities.</a:t>
+            </a:r>
+          </a:p>
+          <a:p>
+            <a:r>
+              <a:rPr lang="en-US" sz="1400" dirty="0">
+                <a:latin typeface="Arial" panose="020B0604020202020204" pitchFamily="34" charset="0"/>
+                <a:cs typeface="Arial" panose="020B0604020202020204" pitchFamily="34" charset="0"/>
+              </a:rPr>
+              <a:t>- Visualizing sensor signals for different physical movements.</a:t>
+            </a:r>
+          </a:p>
+        </p:txBody>
+      </p:sp>
+      <p:pic>
+        <p:nvPicPr>
+          <p:cNvPr id="3" name="Picture 2">
+            <a:extLst>
+              <a:ext uri="{FF2B5EF4-FFF2-40B4-BE49-F238E27FC236}">
+                <a16:creationId xmlns:a16="http://schemas.microsoft.com/office/drawing/2014/main" id="{124A0291-3CB4-D444-5460-7386B8EB4002}"/>
+              </a:ext>
+            </a:extLst>
+          </p:cNvPr>
+          <p:cNvPicPr>
+            <a:picLocks noChangeAspect="1"/>
+          </p:cNvPicPr>
+          <p:nvPr/>
+        </p:nvPicPr>
+        <p:blipFill>
+          <a:blip r:embed="rId2"/>
+          <a:stretch>
+            <a:fillRect/>
+          </a:stretch>
+        </p:blipFill>
+        <p:spPr>
+          <a:xfrm>
+            <a:off x="1170037" y="2512690"/>
+            <a:ext cx="6597447" cy="4143899"/>
+          </a:xfrm>
+          <a:prstGeom prst="rect">
+            <a:avLst/>
+          </a:prstGeom>
+        </p:spPr>
+      </p:pic>
     </p:spTree>
   </p:cSld>
   <p:clrMapOvr>
@@ -7567,47 +7748,102 @@
           <a:chExt cx="0" cy="0"/>
         </a:xfrm>
       </p:grpSpPr>
-      <p:sp>
-        <p:nvSpPr>
-          <p:cNvPr id="2" name="Title 1"/>
-          <p:cNvSpPr>
-            <a:spLocks noGrp="1"/>
-          </p:cNvSpPr>
-          <p:nvPr>
-            <p:ph type="title"/>
-          </p:nvPr>
-        </p:nvSpPr>
-        <p:spPr/>
-        <p:txBody>
-          <a:bodyPr/>
-          <a:lstStyle/>
-          <a:p>
-            <a:r>
-              <a:t>EDA: Gyroscope Time-Series</a:t>
-            </a:r>
-          </a:p>
-        </p:txBody>
-      </p:sp>
-      <p:sp>
-        <p:nvSpPr>
-          <p:cNvPr id="3" name="Content Placeholder 2"/>
-          <p:cNvSpPr>
-            <a:spLocks noGrp="1"/>
-          </p:cNvSpPr>
-          <p:nvPr>
-            <p:ph idx="1"/>
-          </p:nvPr>
-        </p:nvSpPr>
-        <p:spPr/>
-        <p:txBody>
-          <a:bodyPr/>
-          <a:lstStyle/>
-          <a:p>
-            <a:endParaRPr/>
-          </a:p>
-        </p:txBody>
-      </p:sp>
+      <p:pic>
+        <p:nvPicPr>
+          <p:cNvPr id="3" name="Picture 2">
+            <a:extLst>
+              <a:ext uri="{FF2B5EF4-FFF2-40B4-BE49-F238E27FC236}">
+                <a16:creationId xmlns:a16="http://schemas.microsoft.com/office/drawing/2014/main" id="{15BE5420-F394-DCB9-EFEA-9D0A9020E3EA}"/>
+              </a:ext>
+            </a:extLst>
+          </p:cNvPr>
+          <p:cNvPicPr>
+            <a:picLocks noChangeAspect="1"/>
+          </p:cNvPicPr>
+          <p:nvPr/>
+        </p:nvPicPr>
+        <p:blipFill>
+          <a:blip r:embed="rId2"/>
+          <a:stretch>
+            <a:fillRect/>
+          </a:stretch>
+        </p:blipFill>
+        <p:spPr>
+          <a:xfrm>
+            <a:off x="235974" y="331839"/>
+            <a:ext cx="5005166" cy="3217606"/>
+          </a:xfrm>
+          <a:prstGeom prst="rect">
+            <a:avLst/>
+          </a:prstGeom>
+        </p:spPr>
+      </p:pic>
+      <p:pic>
+        <p:nvPicPr>
+          <p:cNvPr id="5" name="Picture 4">
+            <a:extLst>
+              <a:ext uri="{FF2B5EF4-FFF2-40B4-BE49-F238E27FC236}">
+                <a16:creationId xmlns:a16="http://schemas.microsoft.com/office/drawing/2014/main" id="{B6032CAC-7283-A1FB-1C89-C688CF4D6AE9}"/>
+              </a:ext>
+            </a:extLst>
+          </p:cNvPr>
+          <p:cNvPicPr>
+            <a:picLocks noChangeAspect="1"/>
+          </p:cNvPicPr>
+          <p:nvPr/>
+        </p:nvPicPr>
+        <p:blipFill>
+          <a:blip r:embed="rId3"/>
+          <a:stretch>
+            <a:fillRect/>
+          </a:stretch>
+        </p:blipFill>
+        <p:spPr>
+          <a:xfrm>
+            <a:off x="235974" y="3429000"/>
+            <a:ext cx="4752741" cy="3167211"/>
+          </a:xfrm>
+          <a:prstGeom prst="rect">
+            <a:avLst/>
+          </a:prstGeom>
+        </p:spPr>
+      </p:pic>
+      <p:pic>
+        <p:nvPicPr>
+          <p:cNvPr id="7" name="Picture 6">
+            <a:extLst>
+              <a:ext uri="{FF2B5EF4-FFF2-40B4-BE49-F238E27FC236}">
+                <a16:creationId xmlns:a16="http://schemas.microsoft.com/office/drawing/2014/main" id="{0B8D2F83-EAB6-1F6F-8E00-CBC7A42D9868}"/>
+              </a:ext>
+            </a:extLst>
+          </p:cNvPr>
+          <p:cNvPicPr>
+            <a:picLocks noChangeAspect="1"/>
+          </p:cNvPicPr>
+          <p:nvPr/>
+        </p:nvPicPr>
+        <p:blipFill>
+          <a:blip r:embed="rId4"/>
+          <a:stretch>
+            <a:fillRect/>
+          </a:stretch>
+        </p:blipFill>
+        <p:spPr>
+          <a:xfrm>
+            <a:off x="5086005" y="3018504"/>
+            <a:ext cx="4066671" cy="2566220"/>
+          </a:xfrm>
+          <a:prstGeom prst="rect">
+            <a:avLst/>
+          </a:prstGeom>
+        </p:spPr>
+      </p:pic>
     </p:spTree>
+    <p:extLst>
+      <p:ext uri="{BB962C8B-B14F-4D97-AF65-F5344CB8AC3E}">
+        <p14:creationId xmlns:p14="http://schemas.microsoft.com/office/powerpoint/2010/main" val="543727670"/>
+      </p:ext>
+    </p:extLst>
   </p:cSld>
   <p:clrMapOvr>
     <a:masterClrMapping/>
@@ -7676,74 +7912,56 @@
         </p:nvSpPr>
         <p:spPr>
           <a:xfrm>
-            <a:off x="352425" y="876300"/>
-            <a:ext cx="8229600" cy="4525963"/>
+            <a:off x="352424" y="876300"/>
+            <a:ext cx="8334375" cy="5419725"/>
           </a:xfrm>
         </p:spPr>
         <p:txBody>
           <a:bodyPr>
-            <a:normAutofit/>
+            <a:normAutofit fontScale="92500" lnSpcReduction="10000"/>
           </a:bodyPr>
           <a:lstStyle/>
           <a:p>
-            <a:pPr marL="0" indent="0">
-              <a:buNone/>
-            </a:pPr>
-            <a:r>
-              <a:rPr sz="1800" dirty="0">
-                <a:latin typeface="Arial" panose="020B0604020202020204" pitchFamily="34" charset="0"/>
-                <a:cs typeface="Arial" panose="020B0604020202020204" pitchFamily="34" charset="0"/>
-              </a:rPr>
-              <a:t>1. </a:t>
-            </a:r>
-            <a:r>
-              <a:rPr lang="en-IN" sz="1800" dirty="0">
+            <a:pPr>
+              <a:buFont typeface="+mj-lt"/>
+              <a:buAutoNum type="arabicPeriod"/>
+            </a:pPr>
+            <a:r>
+              <a:rPr lang="en-IN" sz="1800" b="1" dirty="0">
                 <a:latin typeface="Arial" panose="020B0604020202020204" pitchFamily="34" charset="0"/>
                 <a:cs typeface="Arial" panose="020B0604020202020204" pitchFamily="34" charset="0"/>
               </a:rPr>
               <a:t>Overview</a:t>
             </a:r>
-            <a:endParaRPr sz="1800" dirty="0">
+            <a:endParaRPr sz="1800" b="1" dirty="0">
               <a:latin typeface="Arial" panose="020B0604020202020204" pitchFamily="34" charset="0"/>
               <a:cs typeface="Arial" panose="020B0604020202020204" pitchFamily="34" charset="0"/>
             </a:endParaRPr>
           </a:p>
           <a:p>
-            <a:pPr marL="0" indent="0">
-              <a:buNone/>
-            </a:pPr>
-            <a:r>
-              <a:rPr sz="1800" dirty="0">
-                <a:latin typeface="Arial" panose="020B0604020202020204" pitchFamily="34" charset="0"/>
-                <a:cs typeface="Arial" panose="020B0604020202020204" pitchFamily="34" charset="0"/>
-              </a:rPr>
-              <a:t>2. </a:t>
-            </a:r>
-            <a:r>
-              <a:rPr lang="en-IN" sz="1800" dirty="0">
+            <a:pPr>
+              <a:buFont typeface="+mj-lt"/>
+              <a:buAutoNum type="arabicPeriod"/>
+            </a:pPr>
+            <a:r>
+              <a:rPr lang="en-IN" sz="1800" b="1" dirty="0">
                 <a:latin typeface="Arial" panose="020B0604020202020204" pitchFamily="34" charset="0"/>
                 <a:cs typeface="Arial" panose="020B0604020202020204" pitchFamily="34" charset="0"/>
               </a:rPr>
               <a:t>Problem Statement</a:t>
             </a:r>
-            <a:endParaRPr sz="1800" dirty="0">
+            <a:endParaRPr sz="1800" b="1" dirty="0">
               <a:latin typeface="Arial" panose="020B0604020202020204" pitchFamily="34" charset="0"/>
               <a:cs typeface="Arial" panose="020B0604020202020204" pitchFamily="34" charset="0"/>
             </a:endParaRPr>
           </a:p>
           <a:p>
-            <a:pPr marL="0" indent="0">
-              <a:buNone/>
-            </a:pPr>
-            <a:r>
-              <a:rPr sz="1800" dirty="0">
-                <a:latin typeface="Arial" panose="020B0604020202020204" pitchFamily="34" charset="0"/>
-                <a:cs typeface="Arial" panose="020B0604020202020204" pitchFamily="34" charset="0"/>
-              </a:rPr>
-              <a:t>3. </a:t>
-            </a:r>
-            <a:r>
-              <a:rPr lang="en-US" sz="1800" i="0" u="none" strike="noStrike" cap="none" dirty="0">
+            <a:pPr>
+              <a:buFont typeface="+mj-lt"/>
+              <a:buAutoNum type="arabicPeriod"/>
+            </a:pPr>
+            <a:r>
+              <a:rPr lang="en-US" sz="1800" b="1" i="0" u="none" strike="noStrike" cap="none" dirty="0">
                 <a:solidFill>
                   <a:schemeClr val="dk1"/>
                 </a:solidFill>
@@ -7756,87 +7974,115 @@
             </a:r>
           </a:p>
           <a:p>
-            <a:pPr marL="0" indent="0">
-              <a:buNone/>
-            </a:pPr>
-            <a:r>
-              <a:rPr sz="1800" dirty="0">
-                <a:latin typeface="Arial" panose="020B0604020202020204" pitchFamily="34" charset="0"/>
-                <a:cs typeface="Arial" panose="020B0604020202020204" pitchFamily="34" charset="0"/>
-              </a:rPr>
-              <a:t>4. </a:t>
-            </a:r>
-            <a:r>
-              <a:rPr lang="en-IN" sz="1800" dirty="0">
+            <a:pPr>
+              <a:buFont typeface="+mj-lt"/>
+              <a:buAutoNum type="arabicPeriod"/>
+            </a:pPr>
+            <a:r>
+              <a:rPr lang="en-IN" sz="1800" b="1" dirty="0">
                 <a:latin typeface="Arial" panose="020B0604020202020204" pitchFamily="34" charset="0"/>
                 <a:cs typeface="Arial" panose="020B0604020202020204" pitchFamily="34" charset="0"/>
               </a:rPr>
               <a:t>Data pre-processed </a:t>
             </a:r>
-            <a:endParaRPr sz="1800" dirty="0">
+            <a:endParaRPr sz="1800" b="1" dirty="0">
               <a:latin typeface="Arial" panose="020B0604020202020204" pitchFamily="34" charset="0"/>
               <a:cs typeface="Arial" panose="020B0604020202020204" pitchFamily="34" charset="0"/>
             </a:endParaRPr>
           </a:p>
           <a:p>
-            <a:pPr marL="0" indent="0">
-              <a:buNone/>
-            </a:pPr>
-            <a:r>
-              <a:rPr sz="1800" dirty="0">
-                <a:latin typeface="Arial" panose="020B0604020202020204" pitchFamily="34" charset="0"/>
-                <a:cs typeface="Arial" panose="020B0604020202020204" pitchFamily="34" charset="0"/>
-              </a:rPr>
-              <a:t>5. </a:t>
-            </a:r>
-            <a:r>
-              <a:rPr lang="en-IN" sz="1800" dirty="0">
+            <a:pPr>
+              <a:buFont typeface="+mj-lt"/>
+              <a:buAutoNum type="arabicPeriod"/>
+            </a:pPr>
+            <a:r>
+              <a:rPr lang="en-IN" sz="1800" b="1" dirty="0">
                 <a:latin typeface="Arial" panose="020B0604020202020204" pitchFamily="34" charset="0"/>
                 <a:cs typeface="Arial" panose="020B0604020202020204" pitchFamily="34" charset="0"/>
               </a:rPr>
               <a:t>Pre-requisite Summary</a:t>
             </a:r>
-            <a:endParaRPr sz="1800" dirty="0">
+            <a:endParaRPr sz="1800" b="1" dirty="0">
               <a:latin typeface="Arial" panose="020B0604020202020204" pitchFamily="34" charset="0"/>
               <a:cs typeface="Arial" panose="020B0604020202020204" pitchFamily="34" charset="0"/>
             </a:endParaRPr>
           </a:p>
           <a:p>
-            <a:pPr marL="0" indent="0">
-              <a:buNone/>
-            </a:pPr>
-            <a:r>
-              <a:rPr lang="en-IN" sz="1800" dirty="0">
-                <a:latin typeface="Arial" panose="020B0604020202020204" pitchFamily="34" charset="0"/>
-                <a:cs typeface="Arial" panose="020B0604020202020204" pitchFamily="34" charset="0"/>
-              </a:rPr>
-              <a:t>6. </a:t>
-            </a:r>
-            <a:r>
-              <a:rPr lang="en-US" sz="1800" dirty="0">
+            <a:pPr>
+              <a:buFont typeface="+mj-lt"/>
+              <a:buAutoNum type="arabicPeriod"/>
+            </a:pPr>
+            <a:r>
+              <a:rPr lang="en-US" sz="1800" b="1" dirty="0">
                 <a:latin typeface="Arial" panose="020B0604020202020204" pitchFamily="34" charset="0"/>
                 <a:cs typeface="Arial" panose="020B0604020202020204" pitchFamily="34" charset="0"/>
               </a:rPr>
               <a:t>Loading and Reading Dataset</a:t>
             </a:r>
-            <a:endParaRPr lang="en-IN" sz="1800" dirty="0">
+          </a:p>
+          <a:p>
+            <a:pPr marL="800100" lvl="1" indent="-342900">
+              <a:buFont typeface="+mj-lt"/>
+              <a:buAutoNum type="alphaUcPeriod"/>
+            </a:pPr>
+            <a:r>
+              <a:rPr lang="en-US" sz="1500" dirty="0">
+                <a:latin typeface="Arial" panose="020B0604020202020204" pitchFamily="34" charset="0"/>
+                <a:cs typeface="Arial" panose="020B0604020202020204" pitchFamily="34" charset="0"/>
+              </a:rPr>
+              <a:t>Dataset Overview</a:t>
+            </a:r>
+          </a:p>
+          <a:p>
+            <a:pPr marL="800100" lvl="1" indent="-342900">
+              <a:buFont typeface="+mj-lt"/>
+              <a:buAutoNum type="alphaUcPeriod"/>
+            </a:pPr>
+            <a:r>
+              <a:rPr lang="en-US" sz="1500" dirty="0">
+                <a:latin typeface="Arial" panose="020B0604020202020204" pitchFamily="34" charset="0"/>
+                <a:cs typeface="Arial" panose="020B0604020202020204" pitchFamily="34" charset="0"/>
+              </a:rPr>
+              <a:t>Finding out the Missing Values</a:t>
+            </a:r>
+          </a:p>
+          <a:p>
+            <a:pPr marL="800100" lvl="1" indent="-342900">
+              <a:buFont typeface="+mj-lt"/>
+              <a:buAutoNum type="alphaUcPeriod"/>
+            </a:pPr>
+            <a:r>
+              <a:rPr lang="en-US" sz="1500" dirty="0">
+                <a:latin typeface="Arial" panose="020B0604020202020204" pitchFamily="34" charset="0"/>
+                <a:cs typeface="Arial" panose="020B0604020202020204" pitchFamily="34" charset="0"/>
+              </a:rPr>
+              <a:t>Investigate participants activity durations</a:t>
+            </a:r>
+          </a:p>
+          <a:p>
+            <a:pPr marL="800100" lvl="1" indent="-342900">
+              <a:buFont typeface="+mj-lt"/>
+              <a:buAutoNum type="alphaUcPeriod"/>
+            </a:pPr>
+            <a:r>
+              <a:rPr lang="en-US" sz="1500" dirty="0">
+                <a:latin typeface="Arial" panose="020B0604020202020204" pitchFamily="34" charset="0"/>
+                <a:cs typeface="Arial" panose="020B0604020202020204" pitchFamily="34" charset="0"/>
+              </a:rPr>
+              <a:t>Normalize the numerical features</a:t>
+            </a:r>
+            <a:endParaRPr lang="en-IN" sz="1500" dirty="0">
               <a:latin typeface="Arial" panose="020B0604020202020204" pitchFamily="34" charset="0"/>
               <a:cs typeface="Arial" panose="020B0604020202020204" pitchFamily="34" charset="0"/>
             </a:endParaRPr>
           </a:p>
           <a:p>
-            <a:pPr marL="0" indent="0">
-              <a:buNone/>
-            </a:pPr>
-            <a:r>
-              <a:rPr sz="1800" dirty="0">
-                <a:latin typeface="Arial" panose="020B0604020202020204" pitchFamily="34" charset="0"/>
-                <a:cs typeface="Arial" panose="020B0604020202020204" pitchFamily="34" charset="0"/>
-              </a:rPr>
-              <a:t>7. </a:t>
-            </a:r>
-            <a:r>
-              <a:rPr lang="en-IN" sz="1800" dirty="0">
+            <a:pPr>
+              <a:buFont typeface="+mj-lt"/>
+              <a:buAutoNum type="arabicPeriod"/>
+            </a:pPr>
+            <a:r>
+              <a:rPr lang="en-IN" sz="1800" b="1" dirty="0">
                 <a:latin typeface="Arial" panose="020B0604020202020204" pitchFamily="34" charset="0"/>
                 <a:cs typeface="Arial" panose="020B0604020202020204" pitchFamily="34" charset="0"/>
               </a:rPr>
@@ -7844,65 +8090,24 @@
             </a:r>
           </a:p>
           <a:p>
-            <a:pPr marL="0" indent="0">
-              <a:buNone/>
-            </a:pPr>
-            <a:r>
-              <a:rPr lang="en-IN" sz="1800" dirty="0">
-                <a:latin typeface="Arial" panose="020B0604020202020204" pitchFamily="34" charset="0"/>
-                <a:cs typeface="Arial" panose="020B0604020202020204" pitchFamily="34" charset="0"/>
-              </a:rPr>
-              <a:t>…..</a:t>
-            </a:r>
-          </a:p>
-          <a:p>
-            <a:pPr marL="0" indent="0">
-              <a:buNone/>
-            </a:pPr>
-            <a:r>
-              <a:rPr lang="en-IN" sz="1800" dirty="0">
-                <a:latin typeface="Arial" panose="020B0604020202020204" pitchFamily="34" charset="0"/>
-                <a:cs typeface="Arial" panose="020B0604020202020204" pitchFamily="34" charset="0"/>
-              </a:rPr>
-              <a:t>…..</a:t>
-            </a:r>
-          </a:p>
-          <a:p>
-            <a:pPr marL="0" indent="0">
-              <a:buNone/>
-            </a:pPr>
-            <a:r>
-              <a:rPr lang="en-IN" sz="1800" dirty="0">
-                <a:latin typeface="Arial" panose="020B0604020202020204" pitchFamily="34" charset="0"/>
-                <a:cs typeface="Arial" panose="020B0604020202020204" pitchFamily="34" charset="0"/>
-              </a:rPr>
-              <a:t>…..</a:t>
-            </a:r>
-          </a:p>
-          <a:p>
-            <a:pPr marL="0" indent="0">
-              <a:buNone/>
-            </a:pPr>
-            <a:r>
-              <a:rPr lang="en-IN" sz="1800" dirty="0">
-                <a:latin typeface="Arial" panose="020B0604020202020204" pitchFamily="34" charset="0"/>
-                <a:cs typeface="Arial" panose="020B0604020202020204" pitchFamily="34" charset="0"/>
-              </a:rPr>
-              <a:t>…..</a:t>
-            </a:r>
-          </a:p>
-          <a:p>
-            <a:pPr marL="0" indent="0">
-              <a:buNone/>
-            </a:pPr>
-            <a:r>
-              <a:rPr lang="en-IN" sz="1800" dirty="0">
-                <a:latin typeface="Arial" panose="020B0604020202020204" pitchFamily="34" charset="0"/>
-                <a:cs typeface="Arial" panose="020B0604020202020204" pitchFamily="34" charset="0"/>
-              </a:rPr>
-              <a:t>…..</a:t>
-            </a:r>
-            <a:endParaRPr sz="1800" dirty="0">
+            <a:pPr marL="800100" lvl="1" indent="-342900">
+              <a:buFont typeface="+mj-lt"/>
+              <a:buAutoNum type="alphaUcPeriod"/>
+            </a:pPr>
+            <a:r>
+              <a:rPr lang="en-US" sz="1500" dirty="0">
+                <a:latin typeface="Arial" panose="020B0604020202020204" pitchFamily="34" charset="0"/>
+                <a:cs typeface="Arial" panose="020B0604020202020204" pitchFamily="34" charset="0"/>
+              </a:rPr>
+              <a:t>Exploratory Data Analysis (EDA) Insights:</a:t>
+            </a:r>
+          </a:p>
+          <a:p>
+            <a:pPr>
+              <a:buFont typeface="+mj-lt"/>
+              <a:buAutoNum type="arabicPeriod"/>
+            </a:pPr>
+            <a:endParaRPr lang="en-IN" sz="1800" b="1" dirty="0">
               <a:latin typeface="Arial" panose="020B0604020202020204" pitchFamily="34" charset="0"/>
               <a:cs typeface="Arial" panose="020B0604020202020204" pitchFamily="34" charset="0"/>
             </a:endParaRPr>
@@ -7912,7 +8117,71 @@
               <a:buNone/>
             </a:pPr>
             <a:r>
-              <a:rPr sz="1800" dirty="0">
+              <a:rPr lang="en-IN" sz="1800" b="1" dirty="0">
+                <a:latin typeface="Arial" panose="020B0604020202020204" pitchFamily="34" charset="0"/>
+                <a:cs typeface="Arial" panose="020B0604020202020204" pitchFamily="34" charset="0"/>
+              </a:rPr>
+              <a:t>…..</a:t>
+            </a:r>
+          </a:p>
+          <a:p>
+            <a:pPr marL="0" indent="0">
+              <a:buNone/>
+            </a:pPr>
+            <a:r>
+              <a:rPr lang="en-IN" sz="1800" b="1" dirty="0">
+                <a:latin typeface="Arial" panose="020B0604020202020204" pitchFamily="34" charset="0"/>
+                <a:cs typeface="Arial" panose="020B0604020202020204" pitchFamily="34" charset="0"/>
+              </a:rPr>
+              <a:t>…..</a:t>
+            </a:r>
+          </a:p>
+          <a:p>
+            <a:pPr marL="0" indent="0">
+              <a:buNone/>
+            </a:pPr>
+            <a:r>
+              <a:rPr lang="en-IN" sz="1800" b="1" dirty="0">
+                <a:latin typeface="Arial" panose="020B0604020202020204" pitchFamily="34" charset="0"/>
+                <a:cs typeface="Arial" panose="020B0604020202020204" pitchFamily="34" charset="0"/>
+              </a:rPr>
+              <a:t>…..</a:t>
+            </a:r>
+          </a:p>
+          <a:p>
+            <a:pPr marL="0" indent="0">
+              <a:buNone/>
+            </a:pPr>
+            <a:r>
+              <a:rPr lang="en-IN" sz="1800" b="1" dirty="0">
+                <a:latin typeface="Arial" panose="020B0604020202020204" pitchFamily="34" charset="0"/>
+                <a:cs typeface="Arial" panose="020B0604020202020204" pitchFamily="34" charset="0"/>
+              </a:rPr>
+              <a:t>…..</a:t>
+            </a:r>
+          </a:p>
+          <a:p>
+            <a:pPr marL="0" indent="0">
+              <a:buNone/>
+            </a:pPr>
+            <a:r>
+              <a:rPr lang="en-IN" sz="1800" b="1" dirty="0">
+                <a:latin typeface="Arial" panose="020B0604020202020204" pitchFamily="34" charset="0"/>
+                <a:cs typeface="Arial" panose="020B0604020202020204" pitchFamily="34" charset="0"/>
+              </a:rPr>
+              <a:t>…..</a:t>
+            </a:r>
+            <a:endParaRPr sz="1800" b="1" dirty="0">
+              <a:latin typeface="Arial" panose="020B0604020202020204" pitchFamily="34" charset="0"/>
+              <a:cs typeface="Arial" panose="020B0604020202020204" pitchFamily="34" charset="0"/>
+            </a:endParaRPr>
+          </a:p>
+          <a:p>
+            <a:pPr marL="0" indent="0">
+              <a:buNone/>
+            </a:pPr>
+            <a:r>
+              <a:rPr sz="1800" b="1" dirty="0">
                 <a:latin typeface="Arial" panose="020B0604020202020204" pitchFamily="34" charset="0"/>
                 <a:cs typeface="Arial" panose="020B0604020202020204" pitchFamily="34" charset="0"/>
               </a:rPr>
@@ -7948,57 +8217,184 @@
       </p:grpSpPr>
       <p:sp>
         <p:nvSpPr>
-          <p:cNvPr id="2" name="Title 1"/>
-          <p:cNvSpPr>
-            <a:spLocks noGrp="1"/>
-          </p:cNvSpPr>
-          <p:nvPr>
-            <p:ph type="title"/>
-          </p:nvPr>
-        </p:nvSpPr>
-        <p:spPr/>
-        <p:txBody>
-          <a:bodyPr/>
+          <p:cNvPr id="2" name="TextBox 1">
+            <a:extLst>
+              <a:ext uri="{FF2B5EF4-FFF2-40B4-BE49-F238E27FC236}">
+                <a16:creationId xmlns:a16="http://schemas.microsoft.com/office/drawing/2014/main" id="{372DF176-25C1-309D-FE7A-FBEE2CAAB8D5}"/>
+              </a:ext>
+            </a:extLst>
+          </p:cNvPr>
+          <p:cNvSpPr txBox="1"/>
+          <p:nvPr/>
+        </p:nvSpPr>
+        <p:spPr>
+          <a:xfrm>
+            <a:off x="599768" y="501445"/>
+            <a:ext cx="8013290" cy="5909310"/>
+          </a:xfrm>
+          <a:prstGeom prst="rect">
+            <a:avLst/>
+          </a:prstGeom>
+          <a:noFill/>
+        </p:spPr>
+        <p:txBody>
+          <a:bodyPr wrap="square" rtlCol="0">
+            <a:spAutoFit/>
+          </a:bodyPr>
           <a:lstStyle/>
           <a:p>
             <a:r>
-              <a:t>Feature Engineering</a:t>
-            </a:r>
-          </a:p>
-        </p:txBody>
-      </p:sp>
-      <p:sp>
-        <p:nvSpPr>
-          <p:cNvPr id="3" name="Content Placeholder 2"/>
-          <p:cNvSpPr>
-            <a:spLocks noGrp="1"/>
-          </p:cNvSpPr>
-          <p:nvPr>
-            <p:ph idx="1"/>
-          </p:nvPr>
-        </p:nvSpPr>
-        <p:spPr/>
-        <p:txBody>
-          <a:bodyPr/>
-          <a:lstStyle/>
-          <a:p>
-            <a:r>
-              <a:t>Created jerk (acceleration change rate).</a:t>
-            </a:r>
-          </a:p>
-          <a:p>
-            <a:r>
-              <a:t>Orientation change via gyroscope drift.</a:t>
-            </a:r>
-          </a:p>
-          <a:p>
-            <a:r>
-              <a:t>Time &amp; frequency domain features (FFT).</a:t>
-            </a:r>
+              <a:rPr lang="en-US" b="1" dirty="0">
+                <a:latin typeface="Arial" panose="020B0604020202020204" pitchFamily="34" charset="0"/>
+                <a:cs typeface="Arial" panose="020B0604020202020204" pitchFamily="34" charset="0"/>
+              </a:rPr>
+              <a:t>A. Exploratory Data Analysis (EDA) Insights:</a:t>
+            </a:r>
+          </a:p>
+          <a:p>
+            <a:endParaRPr lang="en-US" dirty="0">
+              <a:latin typeface="Arial" panose="020B0604020202020204" pitchFamily="34" charset="0"/>
+              <a:cs typeface="Arial" panose="020B0604020202020204" pitchFamily="34" charset="0"/>
+            </a:endParaRPr>
+          </a:p>
+          <a:p>
+            <a:r>
+              <a:rPr lang="en-US" dirty="0">
+                <a:latin typeface="Arial" panose="020B0604020202020204" pitchFamily="34" charset="0"/>
+                <a:cs typeface="Arial" panose="020B0604020202020204" pitchFamily="34" charset="0"/>
+              </a:rPr>
+              <a:t>1. Activity Distribution:</a:t>
+            </a:r>
+          </a:p>
+          <a:p>
+            <a:r>
+              <a:rPr lang="en-US" dirty="0">
+                <a:latin typeface="Arial" panose="020B0604020202020204" pitchFamily="34" charset="0"/>
+                <a:cs typeface="Arial" panose="020B0604020202020204" pitchFamily="34" charset="0"/>
+              </a:rPr>
+              <a:t>- The dataset has a fairly balanced distribution across activity types.</a:t>
+            </a:r>
+          </a:p>
+          <a:p>
+            <a:r>
+              <a:rPr lang="en-US" dirty="0">
+                <a:latin typeface="Arial" panose="020B0604020202020204" pitchFamily="34" charset="0"/>
+                <a:cs typeface="Arial" panose="020B0604020202020204" pitchFamily="34" charset="0"/>
+              </a:rPr>
+              <a:t>- No significant class imbalance, meaning the model won’t require oversampling or under sampling.</a:t>
+            </a:r>
+          </a:p>
+          <a:p>
+            <a:endParaRPr lang="en-US" dirty="0">
+              <a:latin typeface="Arial" panose="020B0604020202020204" pitchFamily="34" charset="0"/>
+              <a:cs typeface="Arial" panose="020B0604020202020204" pitchFamily="34" charset="0"/>
+            </a:endParaRPr>
+          </a:p>
+          <a:p>
+            <a:r>
+              <a:rPr lang="en-US" dirty="0">
+                <a:latin typeface="Arial" panose="020B0604020202020204" pitchFamily="34" charset="0"/>
+                <a:cs typeface="Arial" panose="020B0604020202020204" pitchFamily="34" charset="0"/>
+              </a:rPr>
+              <a:t>2. Speed Variations Across Activities:</a:t>
+            </a:r>
+          </a:p>
+          <a:p>
+            <a:r>
+              <a:rPr lang="en-US" dirty="0">
+                <a:latin typeface="Arial" panose="020B0604020202020204" pitchFamily="34" charset="0"/>
+                <a:cs typeface="Arial" panose="020B0604020202020204" pitchFamily="34" charset="0"/>
+              </a:rPr>
+              <a:t>- Higher speeds are observed in dynamic activities (Walking, Running, Stair Climbing).</a:t>
+            </a:r>
+          </a:p>
+          <a:p>
+            <a:r>
+              <a:rPr lang="en-US" dirty="0">
+                <a:latin typeface="Arial" panose="020B0604020202020204" pitchFamily="34" charset="0"/>
+                <a:cs typeface="Arial" panose="020B0604020202020204" pitchFamily="34" charset="0"/>
+              </a:rPr>
+              <a:t>- Lower speeds in static postures (Standing, Sitting, Laying).</a:t>
+            </a:r>
+          </a:p>
+          <a:p>
+            <a:endParaRPr lang="en-US" dirty="0">
+              <a:latin typeface="Arial" panose="020B0604020202020204" pitchFamily="34" charset="0"/>
+              <a:cs typeface="Arial" panose="020B0604020202020204" pitchFamily="34" charset="0"/>
+            </a:endParaRPr>
+          </a:p>
+          <a:p>
+            <a:r>
+              <a:rPr lang="en-US" dirty="0">
+                <a:latin typeface="Arial" panose="020B0604020202020204" pitchFamily="34" charset="0"/>
+                <a:cs typeface="Arial" panose="020B0604020202020204" pitchFamily="34" charset="0"/>
+              </a:rPr>
+              <a:t>3. Orientation Change Trends:</a:t>
+            </a:r>
+          </a:p>
+          <a:p>
+            <a:r>
+              <a:rPr lang="en-US" dirty="0">
+                <a:latin typeface="Arial" panose="020B0604020202020204" pitchFamily="34" charset="0"/>
+                <a:cs typeface="Arial" panose="020B0604020202020204" pitchFamily="34" charset="0"/>
+              </a:rPr>
+              <a:t>- More significant orientation changes in movement-related activities (Walking, Stair Climbing).</a:t>
+            </a:r>
+          </a:p>
+          <a:p>
+            <a:r>
+              <a:rPr lang="en-US" dirty="0">
+                <a:latin typeface="Arial" panose="020B0604020202020204" pitchFamily="34" charset="0"/>
+                <a:cs typeface="Arial" panose="020B0604020202020204" pitchFamily="34" charset="0"/>
+              </a:rPr>
+              <a:t>- Minimal changes in static activities (Standing, Sitting).</a:t>
+            </a:r>
+          </a:p>
+          <a:p>
+            <a:endParaRPr lang="en-US" dirty="0">
+              <a:latin typeface="Arial" panose="020B0604020202020204" pitchFamily="34" charset="0"/>
+              <a:cs typeface="Arial" panose="020B0604020202020204" pitchFamily="34" charset="0"/>
+            </a:endParaRPr>
+          </a:p>
+          <a:p>
+            <a:r>
+              <a:rPr lang="en-US" dirty="0">
+                <a:latin typeface="Arial" panose="020B0604020202020204" pitchFamily="34" charset="0"/>
+                <a:cs typeface="Arial" panose="020B0604020202020204" pitchFamily="34" charset="0"/>
+              </a:rPr>
+              <a:t>4. Frequency Component Distribution:</a:t>
+            </a:r>
+          </a:p>
+          <a:p>
+            <a:r>
+              <a:rPr lang="en-US" dirty="0">
+                <a:latin typeface="Arial" panose="020B0604020202020204" pitchFamily="34" charset="0"/>
+                <a:cs typeface="Arial" panose="020B0604020202020204" pitchFamily="34" charset="0"/>
+              </a:rPr>
+              <a:t>- Some activities have distinct frequency signatures, making them separable in the feature space.</a:t>
+            </a:r>
+          </a:p>
+          <a:p>
+            <a:r>
+              <a:rPr lang="en-US" dirty="0">
+                <a:latin typeface="Arial" panose="020B0604020202020204" pitchFamily="34" charset="0"/>
+                <a:cs typeface="Arial" panose="020B0604020202020204" pitchFamily="34" charset="0"/>
+              </a:rPr>
+              <a:t>- High-frequency components appear in movement activities.</a:t>
+            </a:r>
+            <a:endParaRPr lang="en-IN" dirty="0">
+              <a:latin typeface="Arial" panose="020B0604020202020204" pitchFamily="34" charset="0"/>
+              <a:cs typeface="Arial" panose="020B0604020202020204" pitchFamily="34" charset="0"/>
+            </a:endParaRPr>
           </a:p>
         </p:txBody>
       </p:sp>
     </p:spTree>
+    <p:extLst>
+      <p:ext uri="{BB962C8B-B14F-4D97-AF65-F5344CB8AC3E}">
+        <p14:creationId xmlns:p14="http://schemas.microsoft.com/office/powerpoint/2010/main" val="2412501254"/>
+      </p:ext>
+    </p:extLst>
   </p:cSld>
   <p:clrMapOvr>
     <a:masterClrMapping/>
@@ -8039,7 +8435,7 @@
           <a:lstStyle/>
           <a:p>
             <a:r>
-              <a:t>Feature Selection</a:t>
+              <a:t>EDA: Gyroscope Mean Values</a:t>
             </a:r>
           </a:p>
         </p:txBody>
@@ -8059,14 +8455,7 @@
           <a:bodyPr/>
           <a:lstStyle/>
           <a:p>
-            <a:r>
-              <a:t>Removed features with &gt;0.9 correlation.</a:t>
-            </a:r>
-          </a:p>
-          <a:p>
-            <a:r>
-              <a:t>561 → 197 features retained.</a:t>
-            </a:r>
+            <a:endParaRPr/>
           </a:p>
         </p:txBody>
       </p:sp>
@@ -8111,7 +8500,7 @@
           <a:lstStyle/>
           <a:p>
             <a:r>
-              <a:t>PCA Reduction</a:t>
+              <a:t>EDA: Accelerometer Time-Series</a:t>
             </a:r>
           </a:p>
         </p:txBody>
@@ -8131,14 +8520,7 @@
           <a:bodyPr/>
           <a:lstStyle/>
           <a:p>
-            <a:r>
-              <a:t>Applied PCA: retained 95% variance.</a:t>
-            </a:r>
-          </a:p>
-          <a:p>
-            <a:r>
-              <a:t>Final: 94 principal components.</a:t>
-            </a:r>
+            <a:endParaRPr/>
           </a:p>
         </p:txBody>
       </p:sp>
@@ -8183,7 +8565,7 @@
           <a:lstStyle/>
           <a:p>
             <a:r>
-              <a:t>Modeling Strategy</a:t>
+              <a:t>EDA: Gyroscope Time-Series</a:t>
             </a:r>
           </a:p>
         </p:txBody>
@@ -8203,14 +8585,7 @@
           <a:bodyPr/>
           <a:lstStyle/>
           <a:p>
-            <a:r>
-              <a:t>Train/Test split: 80/20 (stratified).</a:t>
-            </a:r>
-          </a:p>
-          <a:p>
-            <a:r>
-              <a:t>Evaluation: Accuracy, F1, Recall, Precision.</a:t>
-            </a:r>
+            <a:endParaRPr/>
           </a:p>
         </p:txBody>
       </p:sp>
@@ -8255,7 +8630,7 @@
           <a:lstStyle/>
           <a:p>
             <a:r>
-              <a:t>Logistic Regression</a:t>
+              <a:t>Feature Engineering</a:t>
             </a:r>
           </a:p>
         </p:txBody>
@@ -8276,12 +8651,17 @@
           <a:lstStyle/>
           <a:p>
             <a:r>
-              <a:t>Linear model (max_iter=1000).</a:t>
-            </a:r>
-          </a:p>
-          <a:p>
-            <a:r>
-              <a:t>Test accuracy: ~98.4%</a:t>
+              <a:t>Created jerk (acceleration change rate).</a:t>
+            </a:r>
+          </a:p>
+          <a:p>
+            <a:r>
+              <a:t>Orientation change via gyroscope drift.</a:t>
+            </a:r>
+          </a:p>
+          <a:p>
+            <a:r>
+              <a:t>Time &amp; frequency domain features (FFT).</a:t>
             </a:r>
           </a:p>
         </p:txBody>
@@ -8327,7 +8707,7 @@
           <a:lstStyle/>
           <a:p>
             <a:r>
-              <a:t>Random Forest</a:t>
+              <a:t>Feature Selection</a:t>
             </a:r>
           </a:p>
         </p:txBody>
@@ -8348,12 +8728,12 @@
           <a:lstStyle/>
           <a:p>
             <a:r>
-              <a:t>100 trees, default depth.</a:t>
-            </a:r>
-          </a:p>
-          <a:p>
-            <a:r>
-              <a:t>Test accuracy: ~90.3%</a:t>
+              <a:t>Removed features with &gt;0.9 correlation.</a:t>
+            </a:r>
+          </a:p>
+          <a:p>
+            <a:r>
+              <a:t>561 → 197 features retained.</a:t>
             </a:r>
           </a:p>
         </p:txBody>
@@ -8399,7 +8779,7 @@
           <a:lstStyle/>
           <a:p>
             <a:r>
-              <a:t>SVM (RBF Kernel)</a:t>
+              <a:t>PCA Reduction</a:t>
             </a:r>
           </a:p>
         </p:txBody>
@@ -8420,12 +8800,12 @@
           <a:lstStyle/>
           <a:p>
             <a:r>
-              <a:t>C=1, gamma='scale'</a:t>
-            </a:r>
-          </a:p>
-          <a:p>
-            <a:r>
-              <a:t>Best accuracy: ~98.6%</a:t>
+              <a:t>Applied PCA: retained 95% variance.</a:t>
+            </a:r>
+          </a:p>
+          <a:p>
+            <a:r>
+              <a:t>Final: 94 principal components.</a:t>
             </a:r>
           </a:p>
         </p:txBody>
@@ -8471,7 +8851,7 @@
           <a:lstStyle/>
           <a:p>
             <a:r>
-              <a:t>Model Comparison</a:t>
+              <a:t>Modeling Strategy</a:t>
             </a:r>
           </a:p>
         </p:txBody>
@@ -8492,12 +8872,12 @@
           <a:lstStyle/>
           <a:p>
             <a:r>
-              <a:t>SVM &gt; LR &gt; RF</a:t>
-            </a:r>
-          </a:p>
-          <a:p>
-            <a:r>
-              <a:t>SVM handles non-linear margins best</a:t>
+              <a:t>Train/Test split: 80/20 (stratified).</a:t>
+            </a:r>
+          </a:p>
+          <a:p>
+            <a:r>
+              <a:t>Evaluation: Accuracy, F1, Recall, Precision.</a:t>
             </a:r>
           </a:p>
         </p:txBody>
@@ -8543,7 +8923,7 @@
           <a:lstStyle/>
           <a:p>
             <a:r>
-              <a:t>Model Tuning - CV</a:t>
+              <a:t>Logistic Regression</a:t>
             </a:r>
           </a:p>
         </p:txBody>
@@ -8564,12 +8944,12 @@
           <a:lstStyle/>
           <a:p>
             <a:r>
-              <a:t>5-fold cross-validation.</a:t>
-            </a:r>
-          </a:p>
-          <a:p>
-            <a:r>
-              <a:t>Ensures generalizable results.</a:t>
+              <a:t>Linear model (max_iter=1000).</a:t>
+            </a:r>
+          </a:p>
+          <a:p>
+            <a:r>
+              <a:t>Test accuracy: ~98.4%</a:t>
             </a:r>
           </a:p>
         </p:txBody>
@@ -8615,7 +8995,7 @@
           <a:lstStyle/>
           <a:p>
             <a:r>
-              <a:t>Grid Search (SVM)</a:t>
+              <a:t>Random Forest</a:t>
             </a:r>
           </a:p>
         </p:txBody>
@@ -8636,12 +9016,12 @@
           <a:lstStyle/>
           <a:p>
             <a:r>
-              <a:t>C={0.1,1,10}, gamma={'scale','auto'}</a:t>
-            </a:r>
-          </a:p>
-          <a:p>
-            <a:r>
-              <a:t>Best: C=10, gamma='scale'</a:t>
+              <a:t>100 trees, default depth.</a:t>
+            </a:r>
+          </a:p>
+          <a:p>
+            <a:r>
+              <a:t>Test accuracy: ~90.3%</a:t>
             </a:r>
           </a:p>
         </p:txBody>
@@ -8963,7 +9343,7 @@
           <a:lstStyle/>
           <a:p>
             <a:r>
-              <a:t>Tuned Model</a:t>
+              <a:t>SVM (RBF Kernel)</a:t>
             </a:r>
           </a:p>
         </p:txBody>
@@ -8984,12 +9364,12 @@
           <a:lstStyle/>
           <a:p>
             <a:r>
-              <a:t>Optimized SVM: ~99.1% CV accuracy</a:t>
-            </a:r>
-          </a:p>
-          <a:p>
-            <a:r>
-              <a:t>Improved margin fitting</a:t>
+              <a:t>C=1, gamma='scale'</a:t>
+            </a:r>
+          </a:p>
+          <a:p>
+            <a:r>
+              <a:t>Best accuracy: ~98.6%</a:t>
             </a:r>
           </a:p>
         </p:txBody>
@@ -9035,7 +9415,7 @@
           <a:lstStyle/>
           <a:p>
             <a:r>
-              <a:t>Final Model</a:t>
+              <a:t>Model Comparison</a:t>
             </a:r>
           </a:p>
         </p:txBody>
@@ -9056,12 +9436,12 @@
           <a:lstStyle/>
           <a:p>
             <a:r>
-              <a:t>RBF SVM (C=10) chosen</a:t>
-            </a:r>
-          </a:p>
-          <a:p>
-            <a:r>
-              <a:t>Generalizes with 98–99% test accuracy</a:t>
+              <a:t>SVM &gt; LR &gt; RF</a:t>
+            </a:r>
+          </a:p>
+          <a:p>
+            <a:r>
+              <a:t>SVM handles non-linear margins best</a:t>
             </a:r>
           </a:p>
         </p:txBody>
@@ -9107,7 +9487,7 @@
           <a:lstStyle/>
           <a:p>
             <a:r>
-              <a:t>Key Findings</a:t>
+              <a:t>Model Tuning - CV</a:t>
             </a:r>
           </a:p>
         </p:txBody>
@@ -9128,12 +9508,12 @@
           <a:lstStyle/>
           <a:p>
             <a:r>
-              <a:t>Sensor fusion boosts accuracy</a:t>
-            </a:r>
-          </a:p>
-          <a:p>
-            <a:r>
-              <a:t>Engineered features essential</a:t>
+              <a:t>5-fold cross-validation.</a:t>
+            </a:r>
+          </a:p>
+          <a:p>
+            <a:r>
+              <a:t>Ensures generalizable results.</a:t>
             </a:r>
           </a:p>
         </p:txBody>
@@ -9179,7 +9559,7 @@
           <a:lstStyle/>
           <a:p>
             <a:r>
-              <a:t>Challenges</a:t>
+              <a:t>Grid Search (SVM)</a:t>
             </a:r>
           </a:p>
         </p:txBody>
@@ -9200,12 +9580,12 @@
           <a:lstStyle/>
           <a:p>
             <a:r>
-              <a:t>High dimensionality</a:t>
-            </a:r>
-          </a:p>
-          <a:p>
-            <a:r>
-              <a:t>Subtle differences between activities</a:t>
+              <a:t>C={0.1,1,10}, gamma={'scale','auto'}</a:t>
+            </a:r>
+          </a:p>
+          <a:p>
+            <a:r>
+              <a:t>Best: C=10, gamma='scale'</a:t>
             </a:r>
           </a:p>
         </p:txBody>
@@ -9251,7 +9631,7 @@
           <a:lstStyle/>
           <a:p>
             <a:r>
-              <a:t>Recommendations</a:t>
+              <a:t>Tuned Model</a:t>
             </a:r>
           </a:p>
         </p:txBody>
@@ -9272,14 +9652,12 @@
           <a:lstStyle/>
           <a:p>
             <a:r>
-              <a:rPr dirty="0"/>
-              <a:t>Try LSTM for sequence modeling</a:t>
-            </a:r>
-          </a:p>
-          <a:p>
-            <a:r>
-              <a:rPr dirty="0"/>
-              <a:t>Explore deployment on mobile</a:t>
+              <a:t>Optimized SVM: ~99.1% CV accuracy</a:t>
+            </a:r>
+          </a:p>
+          <a:p>
+            <a:r>
+              <a:t>Improved margin fitting</a:t>
             </a:r>
           </a:p>
         </p:txBody>
@@ -9325,7 +9703,7 @@
           <a:lstStyle/>
           <a:p>
             <a:r>
-              <a:t>Conclusion</a:t>
+              <a:t>Final Model</a:t>
             </a:r>
           </a:p>
         </p:txBody>
@@ -9346,12 +9724,12 @@
           <a:lstStyle/>
           <a:p>
             <a:r>
-              <a:t>Accurate HAR using classical ML</a:t>
-            </a:r>
-          </a:p>
-          <a:p>
-            <a:r>
-              <a:t>Effective preprocessing &amp; tuning</a:t>
+              <a:t>RBF SVM (C=10) chosen</a:t>
+            </a:r>
+          </a:p>
+          <a:p>
+            <a:r>
+              <a:t>Generalizes with 98–99% test accuracy</a:t>
             </a:r>
           </a:p>
         </p:txBody>
@@ -9397,7 +9775,7 @@
           <a:lstStyle/>
           <a:p>
             <a:r>
-              <a:t>Thank You</a:t>
+              <a:t>Key Findings</a:t>
             </a:r>
           </a:p>
         </p:txBody>
@@ -9418,12 +9796,230 @@
           <a:lstStyle/>
           <a:p>
             <a:r>
-              <a:t>Questions?</a:t>
-            </a:r>
-          </a:p>
-          <a:p>
-            <a:r>
-              <a:t>Cohort 11 – Group 6</a:t>
+              <a:t>Sensor fusion boosts accuracy</a:t>
+            </a:r>
+          </a:p>
+          <a:p>
+            <a:r>
+              <a:t>Engineered features essential</a:t>
+            </a:r>
+          </a:p>
+        </p:txBody>
+      </p:sp>
+    </p:spTree>
+  </p:cSld>
+  <p:clrMapOvr>
+    <a:masterClrMapping/>
+  </p:clrMapOvr>
+</p:sld>
+</file>
+
+<file path=ppt/slides/slide37.xml><?xml version="1.0" encoding="utf-8"?>
+<p:sld xmlns:a="http://schemas.openxmlformats.org/drawingml/2006/main" xmlns:r="http://schemas.openxmlformats.org/officeDocument/2006/relationships" xmlns:p="http://schemas.openxmlformats.org/presentationml/2006/main">
+  <p:cSld>
+    <p:spTree>
+      <p:nvGrpSpPr>
+        <p:cNvPr id="1" name=""/>
+        <p:cNvGrpSpPr/>
+        <p:nvPr/>
+      </p:nvGrpSpPr>
+      <p:grpSpPr>
+        <a:xfrm>
+          <a:off x="0" y="0"/>
+          <a:ext cx="0" cy="0"/>
+          <a:chOff x="0" y="0"/>
+          <a:chExt cx="0" cy="0"/>
+        </a:xfrm>
+      </p:grpSpPr>
+      <p:sp>
+        <p:nvSpPr>
+          <p:cNvPr id="2" name="Title 1"/>
+          <p:cNvSpPr>
+            <a:spLocks noGrp="1"/>
+          </p:cNvSpPr>
+          <p:nvPr>
+            <p:ph type="title"/>
+          </p:nvPr>
+        </p:nvSpPr>
+        <p:spPr/>
+        <p:txBody>
+          <a:bodyPr/>
+          <a:lstStyle/>
+          <a:p>
+            <a:r>
+              <a:t>Challenges</a:t>
+            </a:r>
+          </a:p>
+        </p:txBody>
+      </p:sp>
+      <p:sp>
+        <p:nvSpPr>
+          <p:cNvPr id="3" name="Content Placeholder 2"/>
+          <p:cNvSpPr>
+            <a:spLocks noGrp="1"/>
+          </p:cNvSpPr>
+          <p:nvPr>
+            <p:ph idx="1"/>
+          </p:nvPr>
+        </p:nvSpPr>
+        <p:spPr/>
+        <p:txBody>
+          <a:bodyPr/>
+          <a:lstStyle/>
+          <a:p>
+            <a:r>
+              <a:t>High dimensionality</a:t>
+            </a:r>
+          </a:p>
+          <a:p>
+            <a:r>
+              <a:t>Subtle differences between activities</a:t>
+            </a:r>
+          </a:p>
+        </p:txBody>
+      </p:sp>
+    </p:spTree>
+  </p:cSld>
+  <p:clrMapOvr>
+    <a:masterClrMapping/>
+  </p:clrMapOvr>
+</p:sld>
+</file>
+
+<file path=ppt/slides/slide38.xml><?xml version="1.0" encoding="utf-8"?>
+<p:sld xmlns:a="http://schemas.openxmlformats.org/drawingml/2006/main" xmlns:r="http://schemas.openxmlformats.org/officeDocument/2006/relationships" xmlns:p="http://schemas.openxmlformats.org/presentationml/2006/main">
+  <p:cSld>
+    <p:spTree>
+      <p:nvGrpSpPr>
+        <p:cNvPr id="1" name=""/>
+        <p:cNvGrpSpPr/>
+        <p:nvPr/>
+      </p:nvGrpSpPr>
+      <p:grpSpPr>
+        <a:xfrm>
+          <a:off x="0" y="0"/>
+          <a:ext cx="0" cy="0"/>
+          <a:chOff x="0" y="0"/>
+          <a:chExt cx="0" cy="0"/>
+        </a:xfrm>
+      </p:grpSpPr>
+      <p:sp>
+        <p:nvSpPr>
+          <p:cNvPr id="2" name="Title 1"/>
+          <p:cNvSpPr>
+            <a:spLocks noGrp="1"/>
+          </p:cNvSpPr>
+          <p:nvPr>
+            <p:ph type="title"/>
+          </p:nvPr>
+        </p:nvSpPr>
+        <p:spPr/>
+        <p:txBody>
+          <a:bodyPr/>
+          <a:lstStyle/>
+          <a:p>
+            <a:r>
+              <a:t>Recommendations</a:t>
+            </a:r>
+          </a:p>
+        </p:txBody>
+      </p:sp>
+      <p:sp>
+        <p:nvSpPr>
+          <p:cNvPr id="3" name="Content Placeholder 2"/>
+          <p:cNvSpPr>
+            <a:spLocks noGrp="1"/>
+          </p:cNvSpPr>
+          <p:nvPr>
+            <p:ph idx="1"/>
+          </p:nvPr>
+        </p:nvSpPr>
+        <p:spPr/>
+        <p:txBody>
+          <a:bodyPr/>
+          <a:lstStyle/>
+          <a:p>
+            <a:r>
+              <a:rPr dirty="0"/>
+              <a:t>Try LSTM for sequence modeling</a:t>
+            </a:r>
+          </a:p>
+          <a:p>
+            <a:r>
+              <a:rPr dirty="0"/>
+              <a:t>Explore deployment on mobile</a:t>
+            </a:r>
+          </a:p>
+        </p:txBody>
+      </p:sp>
+    </p:spTree>
+  </p:cSld>
+  <p:clrMapOvr>
+    <a:masterClrMapping/>
+  </p:clrMapOvr>
+</p:sld>
+</file>
+
+<file path=ppt/slides/slide39.xml><?xml version="1.0" encoding="utf-8"?>
+<p:sld xmlns:a="http://schemas.openxmlformats.org/drawingml/2006/main" xmlns:r="http://schemas.openxmlformats.org/officeDocument/2006/relationships" xmlns:p="http://schemas.openxmlformats.org/presentationml/2006/main">
+  <p:cSld>
+    <p:spTree>
+      <p:nvGrpSpPr>
+        <p:cNvPr id="1" name=""/>
+        <p:cNvGrpSpPr/>
+        <p:nvPr/>
+      </p:nvGrpSpPr>
+      <p:grpSpPr>
+        <a:xfrm>
+          <a:off x="0" y="0"/>
+          <a:ext cx="0" cy="0"/>
+          <a:chOff x="0" y="0"/>
+          <a:chExt cx="0" cy="0"/>
+        </a:xfrm>
+      </p:grpSpPr>
+      <p:sp>
+        <p:nvSpPr>
+          <p:cNvPr id="2" name="Title 1"/>
+          <p:cNvSpPr>
+            <a:spLocks noGrp="1"/>
+          </p:cNvSpPr>
+          <p:nvPr>
+            <p:ph type="title"/>
+          </p:nvPr>
+        </p:nvSpPr>
+        <p:spPr/>
+        <p:txBody>
+          <a:bodyPr/>
+          <a:lstStyle/>
+          <a:p>
+            <a:r>
+              <a:t>Conclusion</a:t>
+            </a:r>
+          </a:p>
+        </p:txBody>
+      </p:sp>
+      <p:sp>
+        <p:nvSpPr>
+          <p:cNvPr id="3" name="Content Placeholder 2"/>
+          <p:cNvSpPr>
+            <a:spLocks noGrp="1"/>
+          </p:cNvSpPr>
+          <p:nvPr>
+            <p:ph idx="1"/>
+          </p:nvPr>
+        </p:nvSpPr>
+        <p:spPr/>
+        <p:txBody>
+          <a:bodyPr/>
+          <a:lstStyle/>
+          <a:p>
+            <a:r>
+              <a:t>Accurate HAR using classical ML</a:t>
+            </a:r>
+          </a:p>
+          <a:p>
+            <a:r>
+              <a:t>Effective preprocessing &amp; tuning</a:t>
             </a:r>
           </a:p>
         </p:txBody>
@@ -9506,6 +10102,78 @@
               <a:t>2. Problem Statement</a:t>
             </a:r>
             <a:endParaRPr dirty="0"/>
+          </a:p>
+        </p:txBody>
+      </p:sp>
+    </p:spTree>
+  </p:cSld>
+  <p:clrMapOvr>
+    <a:masterClrMapping/>
+  </p:clrMapOvr>
+</p:sld>
+</file>
+
+<file path=ppt/slides/slide40.xml><?xml version="1.0" encoding="utf-8"?>
+<p:sld xmlns:a="http://schemas.openxmlformats.org/drawingml/2006/main" xmlns:r="http://schemas.openxmlformats.org/officeDocument/2006/relationships" xmlns:p="http://schemas.openxmlformats.org/presentationml/2006/main">
+  <p:cSld>
+    <p:spTree>
+      <p:nvGrpSpPr>
+        <p:cNvPr id="1" name=""/>
+        <p:cNvGrpSpPr/>
+        <p:nvPr/>
+      </p:nvGrpSpPr>
+      <p:grpSpPr>
+        <a:xfrm>
+          <a:off x="0" y="0"/>
+          <a:ext cx="0" cy="0"/>
+          <a:chOff x="0" y="0"/>
+          <a:chExt cx="0" cy="0"/>
+        </a:xfrm>
+      </p:grpSpPr>
+      <p:sp>
+        <p:nvSpPr>
+          <p:cNvPr id="2" name="Title 1"/>
+          <p:cNvSpPr>
+            <a:spLocks noGrp="1"/>
+          </p:cNvSpPr>
+          <p:nvPr>
+            <p:ph type="title"/>
+          </p:nvPr>
+        </p:nvSpPr>
+        <p:spPr/>
+        <p:txBody>
+          <a:bodyPr/>
+          <a:lstStyle/>
+          <a:p>
+            <a:r>
+              <a:t>Thank You</a:t>
+            </a:r>
+          </a:p>
+        </p:txBody>
+      </p:sp>
+      <p:sp>
+        <p:nvSpPr>
+          <p:cNvPr id="3" name="Content Placeholder 2"/>
+          <p:cNvSpPr>
+            <a:spLocks noGrp="1"/>
+          </p:cNvSpPr>
+          <p:nvPr>
+            <p:ph idx="1"/>
+          </p:nvPr>
+        </p:nvSpPr>
+        <p:spPr/>
+        <p:txBody>
+          <a:bodyPr/>
+          <a:lstStyle/>
+          <a:p>
+            <a:r>
+              <a:t>Questions?</a:t>
+            </a:r>
+          </a:p>
+          <a:p>
+            <a:r>
+              <a:t>Cohort 11 – Group 6</a:t>
+            </a:r>
           </a:p>
         </p:txBody>
       </p:sp>

</xml_diff>